<commit_message>
change line spacing in ppt
</commit_message>
<xml_diff>
--- a/PowerPoint/ARTS-Lab_USC_slide_template.pptx
+++ b/PowerPoint/ARTS-Lab_USC_slide_template.pptx
@@ -227,7 +227,7 @@
           <a:p>
             <a:fld id="{7D038C9C-4B69-864E-9EEE-DFA43CC144D2}" type="datetimeFigureOut">
               <a:rPr lang="en-US" smtClean="0"/>
-              <a:t>6/19/2024</a:t>
+              <a:t>11/13/2024</a:t>
             </a:fld>
             <a:endParaRPr lang="en-US"/>
           </a:p>
@@ -404,7 +404,7 @@
           <a:p>
             <a:fld id="{41D9A61E-B1D6-C34D-A321-B3E90F6DE630}" type="datetimeFigureOut">
               <a:rPr lang="en-US" smtClean="0"/>
-              <a:t>6/19/2024</a:t>
+              <a:t>11/13/2024</a:t>
             </a:fld>
             <a:endParaRPr lang="en-US"/>
           </a:p>
@@ -960,7 +960,656 @@
 </p:sldLayout>
 </file>
 
-<file path=ppt/slideLayouts/slideLayout10.xml><?xml version="1.0" encoding="utf-8"?>
+<file path=ppt/slideLayouts/slideLayout2.xml><?xml version="1.0" encoding="utf-8"?>
+<p:sldLayout xmlns:a="http://schemas.openxmlformats.org/drawingml/2006/main" xmlns:r="http://schemas.openxmlformats.org/officeDocument/2006/relationships" xmlns:p="http://schemas.openxmlformats.org/presentationml/2006/main" type="obj" preserve="1">
+  <p:cSld name="Title and Content">
+    <p:spTree>
+      <p:nvGrpSpPr>
+        <p:cNvPr id="1" name=""/>
+        <p:cNvGrpSpPr/>
+        <p:nvPr/>
+      </p:nvGrpSpPr>
+      <p:grpSpPr>
+        <a:xfrm>
+          <a:off x="0" y="0"/>
+          <a:ext cx="0" cy="0"/>
+          <a:chOff x="0" y="0"/>
+          <a:chExt cx="0" cy="0"/>
+        </a:xfrm>
+      </p:grpSpPr>
+      <p:sp>
+        <p:nvSpPr>
+          <p:cNvPr id="2" name="Title 1">
+            <a:extLst>
+              <a:ext uri="{FF2B5EF4-FFF2-40B4-BE49-F238E27FC236}">
+                <a16:creationId xmlns:a16="http://schemas.microsoft.com/office/drawing/2014/main" id="{6739ED37-4F17-3341-80DD-6302FD9C0346}"/>
+              </a:ext>
+            </a:extLst>
+          </p:cNvPr>
+          <p:cNvSpPr>
+            <a:spLocks noGrp="1"/>
+          </p:cNvSpPr>
+          <p:nvPr>
+            <p:ph type="title" hasCustomPrompt="1"/>
+          </p:nvPr>
+        </p:nvSpPr>
+        <p:spPr/>
+        <p:txBody>
+          <a:bodyPr>
+            <a:normAutofit/>
+          </a:bodyPr>
+          <a:lstStyle>
+            <a:lvl1pPr>
+              <a:defRPr sz="3600" cap="none">
+                <a:latin typeface="+mj-lt"/>
+              </a:defRPr>
+            </a:lvl1pPr>
+          </a:lstStyle>
+          <a:p>
+            <a:r>
+              <a:rPr lang="en-US" dirty="0"/>
+              <a:t>Click to edit master title style</a:t>
+            </a:r>
+          </a:p>
+        </p:txBody>
+      </p:sp>
+      <p:sp>
+        <p:nvSpPr>
+          <p:cNvPr id="3" name="Content Placeholder 2">
+            <a:extLst>
+              <a:ext uri="{FF2B5EF4-FFF2-40B4-BE49-F238E27FC236}">
+                <a16:creationId xmlns:a16="http://schemas.microsoft.com/office/drawing/2014/main" id="{5456E732-1F86-874D-B35F-F0D15E08E919}"/>
+              </a:ext>
+            </a:extLst>
+          </p:cNvPr>
+          <p:cNvSpPr>
+            <a:spLocks noGrp="1"/>
+          </p:cNvSpPr>
+          <p:nvPr>
+            <p:ph idx="1"/>
+          </p:nvPr>
+        </p:nvSpPr>
+        <p:spPr/>
+        <p:txBody>
+          <a:bodyPr/>
+          <a:lstStyle>
+            <a:lvl1pPr>
+              <a:lnSpc>
+                <a:spcPct val="100000"/>
+              </a:lnSpc>
+              <a:defRPr/>
+            </a:lvl1pPr>
+            <a:lvl2pPr>
+              <a:lnSpc>
+                <a:spcPct val="100000"/>
+              </a:lnSpc>
+              <a:defRPr/>
+            </a:lvl2pPr>
+            <a:lvl3pPr>
+              <a:lnSpc>
+                <a:spcPct val="100000"/>
+              </a:lnSpc>
+              <a:defRPr/>
+            </a:lvl3pPr>
+            <a:lvl4pPr>
+              <a:lnSpc>
+                <a:spcPct val="100000"/>
+              </a:lnSpc>
+              <a:defRPr/>
+            </a:lvl4pPr>
+            <a:lvl5pPr>
+              <a:lnSpc>
+                <a:spcPct val="100000"/>
+              </a:lnSpc>
+              <a:defRPr/>
+            </a:lvl5pPr>
+          </a:lstStyle>
+          <a:p>
+            <a:pPr lvl="0"/>
+            <a:r>
+              <a:rPr lang="en-US"/>
+              <a:t>Click to edit Master text styles</a:t>
+            </a:r>
+          </a:p>
+          <a:p>
+            <a:pPr lvl="1"/>
+            <a:r>
+              <a:rPr lang="en-US"/>
+              <a:t>Second level</a:t>
+            </a:r>
+          </a:p>
+          <a:p>
+            <a:pPr lvl="2"/>
+            <a:r>
+              <a:rPr lang="en-US"/>
+              <a:t>Third level</a:t>
+            </a:r>
+          </a:p>
+          <a:p>
+            <a:pPr lvl="3"/>
+            <a:r>
+              <a:rPr lang="en-US"/>
+              <a:t>Fourth level</a:t>
+            </a:r>
+          </a:p>
+          <a:p>
+            <a:pPr lvl="4"/>
+            <a:r>
+              <a:rPr lang="en-US"/>
+              <a:t>Fifth level</a:t>
+            </a:r>
+          </a:p>
+        </p:txBody>
+      </p:sp>
+      <p:sp>
+        <p:nvSpPr>
+          <p:cNvPr id="5" name="Footer Placeholder 4">
+            <a:extLst>
+              <a:ext uri="{FF2B5EF4-FFF2-40B4-BE49-F238E27FC236}">
+                <a16:creationId xmlns:a16="http://schemas.microsoft.com/office/drawing/2014/main" id="{C2C13372-CC48-6246-83C0-B536F3DCA74E}"/>
+              </a:ext>
+            </a:extLst>
+          </p:cNvPr>
+          <p:cNvSpPr>
+            <a:spLocks noGrp="1"/>
+          </p:cNvSpPr>
+          <p:nvPr>
+            <p:ph type="ftr" sz="quarter" idx="11"/>
+          </p:nvPr>
+        </p:nvSpPr>
+        <p:spPr/>
+        <p:txBody>
+          <a:bodyPr/>
+          <a:lstStyle/>
+          <a:p>
+            <a:endParaRPr lang="en-US"/>
+          </a:p>
+        </p:txBody>
+      </p:sp>
+      <p:sp>
+        <p:nvSpPr>
+          <p:cNvPr id="6" name="Slide Number Placeholder 5">
+            <a:extLst>
+              <a:ext uri="{FF2B5EF4-FFF2-40B4-BE49-F238E27FC236}">
+                <a16:creationId xmlns:a16="http://schemas.microsoft.com/office/drawing/2014/main" id="{5B75CF31-8755-3E42-B89A-9D67D96D7102}"/>
+              </a:ext>
+            </a:extLst>
+          </p:cNvPr>
+          <p:cNvSpPr>
+            <a:spLocks noGrp="1"/>
+          </p:cNvSpPr>
+          <p:nvPr>
+            <p:ph type="sldNum" sz="quarter" idx="12"/>
+          </p:nvPr>
+        </p:nvSpPr>
+        <p:spPr>
+          <a:xfrm>
+            <a:off x="838200" y="6004323"/>
+            <a:ext cx="2635332" cy="365125"/>
+          </a:xfrm>
+        </p:spPr>
+        <p:txBody>
+          <a:bodyPr/>
+          <a:lstStyle/>
+          <a:p>
+            <a:fld id="{B4E9AFF7-6653-6A4D-A979-64D2F5BECA26}" type="slidenum">
+              <a:rPr lang="en-US" smtClean="0"/>
+              <a:t>‹#›</a:t>
+            </a:fld>
+            <a:endParaRPr lang="en-US"/>
+          </a:p>
+        </p:txBody>
+      </p:sp>
+    </p:spTree>
+    <p:extLst>
+      <p:ext uri="{BB962C8B-B14F-4D97-AF65-F5344CB8AC3E}">
+        <p14:creationId xmlns:p14="http://schemas.microsoft.com/office/powerpoint/2010/main" val="306765995"/>
+      </p:ext>
+    </p:extLst>
+  </p:cSld>
+  <p:clrMapOvr>
+    <a:masterClrMapping/>
+  </p:clrMapOvr>
+</p:sldLayout>
+</file>
+
+<file path=ppt/slideLayouts/slideLayout3.xml><?xml version="1.0" encoding="utf-8"?>
+<p:sldLayout xmlns:a="http://schemas.openxmlformats.org/drawingml/2006/main" xmlns:r="http://schemas.openxmlformats.org/officeDocument/2006/relationships" xmlns:p="http://schemas.openxmlformats.org/presentationml/2006/main" type="twoObj" preserve="1">
+  <p:cSld name="Two Content">
+    <p:spTree>
+      <p:nvGrpSpPr>
+        <p:cNvPr id="1" name=""/>
+        <p:cNvGrpSpPr/>
+        <p:nvPr/>
+      </p:nvGrpSpPr>
+      <p:grpSpPr>
+        <a:xfrm>
+          <a:off x="0" y="0"/>
+          <a:ext cx="0" cy="0"/>
+          <a:chOff x="0" y="0"/>
+          <a:chExt cx="0" cy="0"/>
+        </a:xfrm>
+      </p:grpSpPr>
+      <p:sp>
+        <p:nvSpPr>
+          <p:cNvPr id="2" name="Title 1">
+            <a:extLst>
+              <a:ext uri="{FF2B5EF4-FFF2-40B4-BE49-F238E27FC236}">
+                <a16:creationId xmlns:a16="http://schemas.microsoft.com/office/drawing/2014/main" id="{A2BBC8D6-6BCB-BD4B-B6E0-92A778004EF5}"/>
+              </a:ext>
+            </a:extLst>
+          </p:cNvPr>
+          <p:cNvSpPr>
+            <a:spLocks noGrp="1"/>
+          </p:cNvSpPr>
+          <p:nvPr>
+            <p:ph type="title" hasCustomPrompt="1"/>
+          </p:nvPr>
+        </p:nvSpPr>
+        <p:spPr/>
+        <p:txBody>
+          <a:bodyPr>
+            <a:normAutofit/>
+          </a:bodyPr>
+          <a:lstStyle>
+            <a:lvl1pPr>
+              <a:defRPr sz="3600" cap="none">
+                <a:latin typeface="+mj-lt"/>
+              </a:defRPr>
+            </a:lvl1pPr>
+          </a:lstStyle>
+          <a:p>
+            <a:r>
+              <a:rPr lang="en-US" dirty="0"/>
+              <a:t>Click to edit master title style</a:t>
+            </a:r>
+          </a:p>
+        </p:txBody>
+      </p:sp>
+      <p:sp>
+        <p:nvSpPr>
+          <p:cNvPr id="3" name="Content Placeholder 2">
+            <a:extLst>
+              <a:ext uri="{FF2B5EF4-FFF2-40B4-BE49-F238E27FC236}">
+                <a16:creationId xmlns:a16="http://schemas.microsoft.com/office/drawing/2014/main" id="{2BC4099C-8353-F44E-8406-26AC07974CEE}"/>
+              </a:ext>
+            </a:extLst>
+          </p:cNvPr>
+          <p:cNvSpPr>
+            <a:spLocks noGrp="1"/>
+          </p:cNvSpPr>
+          <p:nvPr>
+            <p:ph sz="half" idx="1"/>
+          </p:nvPr>
+        </p:nvSpPr>
+        <p:spPr>
+          <a:xfrm>
+            <a:off x="838200" y="1825625"/>
+            <a:ext cx="5181600" cy="4043761"/>
+          </a:xfrm>
+        </p:spPr>
+        <p:txBody>
+          <a:bodyPr/>
+          <a:lstStyle>
+            <a:lvl1pPr>
+              <a:lnSpc>
+                <a:spcPct val="100000"/>
+              </a:lnSpc>
+              <a:defRPr/>
+            </a:lvl1pPr>
+            <a:lvl2pPr>
+              <a:lnSpc>
+                <a:spcPct val="100000"/>
+              </a:lnSpc>
+              <a:defRPr/>
+            </a:lvl2pPr>
+            <a:lvl3pPr>
+              <a:lnSpc>
+                <a:spcPct val="100000"/>
+              </a:lnSpc>
+              <a:defRPr/>
+            </a:lvl3pPr>
+            <a:lvl4pPr>
+              <a:lnSpc>
+                <a:spcPct val="100000"/>
+              </a:lnSpc>
+              <a:defRPr/>
+            </a:lvl4pPr>
+            <a:lvl5pPr>
+              <a:lnSpc>
+                <a:spcPct val="100000"/>
+              </a:lnSpc>
+              <a:defRPr/>
+            </a:lvl5pPr>
+          </a:lstStyle>
+          <a:p>
+            <a:pPr lvl="0"/>
+            <a:r>
+              <a:rPr lang="en-US" dirty="0"/>
+              <a:t>Click to edit Master text styles</a:t>
+            </a:r>
+          </a:p>
+          <a:p>
+            <a:pPr lvl="1"/>
+            <a:r>
+              <a:rPr lang="en-US" dirty="0"/>
+              <a:t>Second level</a:t>
+            </a:r>
+          </a:p>
+          <a:p>
+            <a:pPr lvl="2"/>
+            <a:r>
+              <a:rPr lang="en-US" dirty="0"/>
+              <a:t>Third level</a:t>
+            </a:r>
+          </a:p>
+          <a:p>
+            <a:pPr lvl="3"/>
+            <a:r>
+              <a:rPr lang="en-US" dirty="0"/>
+              <a:t>Fourth level</a:t>
+            </a:r>
+          </a:p>
+          <a:p>
+            <a:pPr lvl="4"/>
+            <a:r>
+              <a:rPr lang="en-US" dirty="0"/>
+              <a:t>Fifth level</a:t>
+            </a:r>
+          </a:p>
+        </p:txBody>
+      </p:sp>
+      <p:sp>
+        <p:nvSpPr>
+          <p:cNvPr id="4" name="Content Placeholder 3">
+            <a:extLst>
+              <a:ext uri="{FF2B5EF4-FFF2-40B4-BE49-F238E27FC236}">
+                <a16:creationId xmlns:a16="http://schemas.microsoft.com/office/drawing/2014/main" id="{F8F8CC49-08EF-8048-B6B2-BC247008F046}"/>
+              </a:ext>
+            </a:extLst>
+          </p:cNvPr>
+          <p:cNvSpPr>
+            <a:spLocks noGrp="1"/>
+          </p:cNvSpPr>
+          <p:nvPr>
+            <p:ph sz="half" idx="2"/>
+          </p:nvPr>
+        </p:nvSpPr>
+        <p:spPr>
+          <a:xfrm>
+            <a:off x="6172200" y="1825625"/>
+            <a:ext cx="5181600" cy="4043761"/>
+          </a:xfrm>
+        </p:spPr>
+        <p:txBody>
+          <a:bodyPr/>
+          <a:lstStyle>
+            <a:lvl1pPr>
+              <a:lnSpc>
+                <a:spcPct val="100000"/>
+              </a:lnSpc>
+              <a:defRPr/>
+            </a:lvl1pPr>
+            <a:lvl2pPr>
+              <a:lnSpc>
+                <a:spcPct val="100000"/>
+              </a:lnSpc>
+              <a:defRPr/>
+            </a:lvl2pPr>
+            <a:lvl3pPr>
+              <a:lnSpc>
+                <a:spcPct val="100000"/>
+              </a:lnSpc>
+              <a:defRPr/>
+            </a:lvl3pPr>
+            <a:lvl4pPr>
+              <a:lnSpc>
+                <a:spcPct val="100000"/>
+              </a:lnSpc>
+              <a:defRPr/>
+            </a:lvl4pPr>
+            <a:lvl5pPr>
+              <a:lnSpc>
+                <a:spcPct val="100000"/>
+              </a:lnSpc>
+              <a:defRPr/>
+            </a:lvl5pPr>
+          </a:lstStyle>
+          <a:p>
+            <a:pPr lvl="0"/>
+            <a:r>
+              <a:rPr lang="en-US"/>
+              <a:t>Click to edit Master text styles</a:t>
+            </a:r>
+          </a:p>
+          <a:p>
+            <a:pPr lvl="1"/>
+            <a:r>
+              <a:rPr lang="en-US"/>
+              <a:t>Second level</a:t>
+            </a:r>
+          </a:p>
+          <a:p>
+            <a:pPr lvl="2"/>
+            <a:r>
+              <a:rPr lang="en-US"/>
+              <a:t>Third level</a:t>
+            </a:r>
+          </a:p>
+          <a:p>
+            <a:pPr lvl="3"/>
+            <a:r>
+              <a:rPr lang="en-US"/>
+              <a:t>Fourth level</a:t>
+            </a:r>
+          </a:p>
+          <a:p>
+            <a:pPr lvl="4"/>
+            <a:r>
+              <a:rPr lang="en-US"/>
+              <a:t>Fifth level</a:t>
+            </a:r>
+          </a:p>
+        </p:txBody>
+      </p:sp>
+      <p:sp>
+        <p:nvSpPr>
+          <p:cNvPr id="6" name="Footer Placeholder 5">
+            <a:extLst>
+              <a:ext uri="{FF2B5EF4-FFF2-40B4-BE49-F238E27FC236}">
+                <a16:creationId xmlns:a16="http://schemas.microsoft.com/office/drawing/2014/main" id="{82CCBEF1-4544-884E-86EB-5374139098CC}"/>
+              </a:ext>
+            </a:extLst>
+          </p:cNvPr>
+          <p:cNvSpPr>
+            <a:spLocks noGrp="1"/>
+          </p:cNvSpPr>
+          <p:nvPr>
+            <p:ph type="ftr" sz="quarter" idx="11"/>
+          </p:nvPr>
+        </p:nvSpPr>
+        <p:spPr/>
+        <p:txBody>
+          <a:bodyPr/>
+          <a:lstStyle/>
+          <a:p>
+            <a:endParaRPr lang="en-US"/>
+          </a:p>
+        </p:txBody>
+      </p:sp>
+      <p:sp>
+        <p:nvSpPr>
+          <p:cNvPr id="7" name="Slide Number Placeholder 6">
+            <a:extLst>
+              <a:ext uri="{FF2B5EF4-FFF2-40B4-BE49-F238E27FC236}">
+                <a16:creationId xmlns:a16="http://schemas.microsoft.com/office/drawing/2014/main" id="{5277F880-2CCE-9044-8CE8-A7CF47CE5236}"/>
+              </a:ext>
+            </a:extLst>
+          </p:cNvPr>
+          <p:cNvSpPr>
+            <a:spLocks noGrp="1"/>
+          </p:cNvSpPr>
+          <p:nvPr>
+            <p:ph type="sldNum" sz="quarter" idx="12"/>
+          </p:nvPr>
+        </p:nvSpPr>
+        <p:spPr>
+          <a:xfrm>
+            <a:off x="838200" y="6004323"/>
+            <a:ext cx="2688771" cy="365125"/>
+          </a:xfrm>
+        </p:spPr>
+        <p:txBody>
+          <a:bodyPr/>
+          <a:lstStyle/>
+          <a:p>
+            <a:fld id="{B4E9AFF7-6653-6A4D-A979-64D2F5BECA26}" type="slidenum">
+              <a:rPr lang="en-US" smtClean="0"/>
+              <a:t>‹#›</a:t>
+            </a:fld>
+            <a:endParaRPr lang="en-US"/>
+          </a:p>
+        </p:txBody>
+      </p:sp>
+    </p:spTree>
+    <p:extLst>
+      <p:ext uri="{BB962C8B-B14F-4D97-AF65-F5344CB8AC3E}">
+        <p14:creationId xmlns:p14="http://schemas.microsoft.com/office/powerpoint/2010/main" val="2524532774"/>
+      </p:ext>
+    </p:extLst>
+  </p:cSld>
+  <p:clrMapOvr>
+    <a:masterClrMapping/>
+  </p:clrMapOvr>
+</p:sldLayout>
+</file>
+
+<file path=ppt/slideLayouts/slideLayout4.xml><?xml version="1.0" encoding="utf-8"?>
+<p:sldLayout xmlns:a="http://schemas.openxmlformats.org/drawingml/2006/main" xmlns:r="http://schemas.openxmlformats.org/officeDocument/2006/relationships" xmlns:p="http://schemas.openxmlformats.org/presentationml/2006/main" type="titleOnly" preserve="1">
+  <p:cSld name="Title Only">
+    <p:spTree>
+      <p:nvGrpSpPr>
+        <p:cNvPr id="1" name=""/>
+        <p:cNvGrpSpPr/>
+        <p:nvPr/>
+      </p:nvGrpSpPr>
+      <p:grpSpPr>
+        <a:xfrm>
+          <a:off x="0" y="0"/>
+          <a:ext cx="0" cy="0"/>
+          <a:chOff x="0" y="0"/>
+          <a:chExt cx="0" cy="0"/>
+        </a:xfrm>
+      </p:grpSpPr>
+      <p:sp>
+        <p:nvSpPr>
+          <p:cNvPr id="2" name="Title 1">
+            <a:extLst>
+              <a:ext uri="{FF2B5EF4-FFF2-40B4-BE49-F238E27FC236}">
+                <a16:creationId xmlns:a16="http://schemas.microsoft.com/office/drawing/2014/main" id="{5AE59A27-C210-CF48-97F8-943B5EBAC6EC}"/>
+              </a:ext>
+            </a:extLst>
+          </p:cNvPr>
+          <p:cNvSpPr>
+            <a:spLocks noGrp="1"/>
+          </p:cNvSpPr>
+          <p:nvPr>
+            <p:ph type="title" hasCustomPrompt="1"/>
+          </p:nvPr>
+        </p:nvSpPr>
+        <p:spPr/>
+        <p:txBody>
+          <a:bodyPr>
+            <a:normAutofit/>
+          </a:bodyPr>
+          <a:lstStyle>
+            <a:lvl1pPr>
+              <a:defRPr sz="3600" cap="none">
+                <a:latin typeface="+mj-lt"/>
+              </a:defRPr>
+            </a:lvl1pPr>
+          </a:lstStyle>
+          <a:p>
+            <a:r>
+              <a:rPr lang="en-US" dirty="0"/>
+              <a:t>Click to edit master title style</a:t>
+            </a:r>
+          </a:p>
+        </p:txBody>
+      </p:sp>
+      <p:sp>
+        <p:nvSpPr>
+          <p:cNvPr id="4" name="Footer Placeholder 3">
+            <a:extLst>
+              <a:ext uri="{FF2B5EF4-FFF2-40B4-BE49-F238E27FC236}">
+                <a16:creationId xmlns:a16="http://schemas.microsoft.com/office/drawing/2014/main" id="{385EC86A-0D15-764F-AA81-41016E208EA3}"/>
+              </a:ext>
+            </a:extLst>
+          </p:cNvPr>
+          <p:cNvSpPr>
+            <a:spLocks noGrp="1"/>
+          </p:cNvSpPr>
+          <p:nvPr>
+            <p:ph type="ftr" sz="quarter" idx="11"/>
+          </p:nvPr>
+        </p:nvSpPr>
+        <p:spPr/>
+        <p:txBody>
+          <a:bodyPr/>
+          <a:lstStyle/>
+          <a:p>
+            <a:endParaRPr lang="en-US"/>
+          </a:p>
+        </p:txBody>
+      </p:sp>
+      <p:sp>
+        <p:nvSpPr>
+          <p:cNvPr id="5" name="Slide Number Placeholder 4">
+            <a:extLst>
+              <a:ext uri="{FF2B5EF4-FFF2-40B4-BE49-F238E27FC236}">
+                <a16:creationId xmlns:a16="http://schemas.microsoft.com/office/drawing/2014/main" id="{9B633FAA-B5EA-C54D-A18B-17F16CA5F110}"/>
+              </a:ext>
+            </a:extLst>
+          </p:cNvPr>
+          <p:cNvSpPr>
+            <a:spLocks noGrp="1"/>
+          </p:cNvSpPr>
+          <p:nvPr>
+            <p:ph type="sldNum" sz="quarter" idx="12"/>
+          </p:nvPr>
+        </p:nvSpPr>
+        <p:spPr>
+          <a:xfrm>
+            <a:off x="838200" y="6005974"/>
+            <a:ext cx="2670958" cy="365125"/>
+          </a:xfrm>
+        </p:spPr>
+        <p:txBody>
+          <a:bodyPr/>
+          <a:lstStyle/>
+          <a:p>
+            <a:fld id="{B4E9AFF7-6653-6A4D-A979-64D2F5BECA26}" type="slidenum">
+              <a:rPr lang="en-US" smtClean="0"/>
+              <a:t>‹#›</a:t>
+            </a:fld>
+            <a:endParaRPr lang="en-US"/>
+          </a:p>
+        </p:txBody>
+      </p:sp>
+    </p:spTree>
+    <p:extLst>
+      <p:ext uri="{BB962C8B-B14F-4D97-AF65-F5344CB8AC3E}">
+        <p14:creationId xmlns:p14="http://schemas.microsoft.com/office/powerpoint/2010/main" val="2971224310"/>
+      </p:ext>
+    </p:extLst>
+  </p:cSld>
+  <p:clrMapOvr>
+    <a:masterClrMapping/>
+  </p:clrMapOvr>
+</p:sldLayout>
+</file>
+
+<file path=ppt/slideLayouts/slideLayout5.xml><?xml version="1.0" encoding="utf-8"?>
 <p:sldLayout xmlns:a="http://schemas.openxmlformats.org/drawingml/2006/main" xmlns:r="http://schemas.openxmlformats.org/officeDocument/2006/relationships" xmlns:p="http://schemas.openxmlformats.org/presentationml/2006/main" showMasterSp="0" type="secHead" preserve="1">
   <p:cSld name="Conclusion">
     <p:bg>
@@ -1214,7 +1863,7 @@
 </p:sldLayout>
 </file>
 
-<file path=ppt/slideLayouts/slideLayout11.xml><?xml version="1.0" encoding="utf-8"?>
+<file path=ppt/slideLayouts/slideLayout6.xml><?xml version="1.0" encoding="utf-8"?>
 <p:sldLayout xmlns:a="http://schemas.openxmlformats.org/drawingml/2006/main" xmlns:r="http://schemas.openxmlformats.org/officeDocument/2006/relationships" xmlns:p="http://schemas.openxmlformats.org/presentationml/2006/main" showMasterSp="0" preserve="1" userDrawn="1">
   <p:cSld name="Section Break">
     <p:bg>
@@ -1302,1905 +1951,13 @@
 </p:sldLayout>
 </file>
 
-<file path=ppt/slideLayouts/slideLayout2.xml><?xml version="1.0" encoding="utf-8"?>
-<p:sldLayout xmlns:a="http://schemas.openxmlformats.org/drawingml/2006/main" xmlns:r="http://schemas.openxmlformats.org/officeDocument/2006/relationships" xmlns:p="http://schemas.openxmlformats.org/presentationml/2006/main" type="obj" preserve="1">
-  <p:cSld name="Title and Content">
-    <p:spTree>
-      <p:nvGrpSpPr>
-        <p:cNvPr id="1" name=""/>
-        <p:cNvGrpSpPr/>
-        <p:nvPr/>
-      </p:nvGrpSpPr>
-      <p:grpSpPr>
-        <a:xfrm>
-          <a:off x="0" y="0"/>
-          <a:ext cx="0" cy="0"/>
-          <a:chOff x="0" y="0"/>
-          <a:chExt cx="0" cy="0"/>
-        </a:xfrm>
-      </p:grpSpPr>
-      <p:sp>
-        <p:nvSpPr>
-          <p:cNvPr id="2" name="Title 1">
-            <a:extLst>
-              <a:ext uri="{FF2B5EF4-FFF2-40B4-BE49-F238E27FC236}">
-                <a16:creationId xmlns:a16="http://schemas.microsoft.com/office/drawing/2014/main" id="{6739ED37-4F17-3341-80DD-6302FD9C0346}"/>
-              </a:ext>
-            </a:extLst>
-          </p:cNvPr>
-          <p:cNvSpPr>
-            <a:spLocks noGrp="1"/>
-          </p:cNvSpPr>
-          <p:nvPr>
-            <p:ph type="title" hasCustomPrompt="1"/>
-          </p:nvPr>
-        </p:nvSpPr>
-        <p:spPr/>
-        <p:txBody>
-          <a:bodyPr>
-            <a:normAutofit/>
-          </a:bodyPr>
-          <a:lstStyle>
-            <a:lvl1pPr>
-              <a:defRPr sz="3600" cap="none">
-                <a:latin typeface="+mj-lt"/>
-              </a:defRPr>
-            </a:lvl1pPr>
-          </a:lstStyle>
-          <a:p>
-            <a:r>
-              <a:rPr lang="en-US" dirty="0"/>
-              <a:t>Click to edit master title style</a:t>
-            </a:r>
-          </a:p>
-        </p:txBody>
-      </p:sp>
-      <p:sp>
-        <p:nvSpPr>
-          <p:cNvPr id="3" name="Content Placeholder 2">
-            <a:extLst>
-              <a:ext uri="{FF2B5EF4-FFF2-40B4-BE49-F238E27FC236}">
-                <a16:creationId xmlns:a16="http://schemas.microsoft.com/office/drawing/2014/main" id="{5456E732-1F86-874D-B35F-F0D15E08E919}"/>
-              </a:ext>
-            </a:extLst>
-          </p:cNvPr>
-          <p:cNvSpPr>
-            <a:spLocks noGrp="1"/>
-          </p:cNvSpPr>
-          <p:nvPr>
-            <p:ph idx="1"/>
-          </p:nvPr>
-        </p:nvSpPr>
-        <p:spPr/>
-        <p:txBody>
-          <a:bodyPr/>
-          <a:lstStyle/>
-          <a:p>
-            <a:pPr lvl="0"/>
-            <a:r>
-              <a:rPr lang="en-US"/>
-              <a:t>Click to edit Master text styles</a:t>
-            </a:r>
-          </a:p>
-          <a:p>
-            <a:pPr lvl="1"/>
-            <a:r>
-              <a:rPr lang="en-US"/>
-              <a:t>Second level</a:t>
-            </a:r>
-          </a:p>
-          <a:p>
-            <a:pPr lvl="2"/>
-            <a:r>
-              <a:rPr lang="en-US"/>
-              <a:t>Third level</a:t>
-            </a:r>
-          </a:p>
-          <a:p>
-            <a:pPr lvl="3"/>
-            <a:r>
-              <a:rPr lang="en-US"/>
-              <a:t>Fourth level</a:t>
-            </a:r>
-          </a:p>
-          <a:p>
-            <a:pPr lvl="4"/>
-            <a:r>
-              <a:rPr lang="en-US"/>
-              <a:t>Fifth level</a:t>
-            </a:r>
-          </a:p>
-        </p:txBody>
-      </p:sp>
-      <p:sp>
-        <p:nvSpPr>
-          <p:cNvPr id="5" name="Footer Placeholder 4">
-            <a:extLst>
-              <a:ext uri="{FF2B5EF4-FFF2-40B4-BE49-F238E27FC236}">
-                <a16:creationId xmlns:a16="http://schemas.microsoft.com/office/drawing/2014/main" id="{C2C13372-CC48-6246-83C0-B536F3DCA74E}"/>
-              </a:ext>
-            </a:extLst>
-          </p:cNvPr>
-          <p:cNvSpPr>
-            <a:spLocks noGrp="1"/>
-          </p:cNvSpPr>
-          <p:nvPr>
-            <p:ph type="ftr" sz="quarter" idx="11"/>
-          </p:nvPr>
-        </p:nvSpPr>
-        <p:spPr/>
-        <p:txBody>
-          <a:bodyPr/>
-          <a:lstStyle/>
-          <a:p>
-            <a:endParaRPr lang="en-US"/>
-          </a:p>
-        </p:txBody>
-      </p:sp>
-      <p:sp>
-        <p:nvSpPr>
-          <p:cNvPr id="6" name="Slide Number Placeholder 5">
-            <a:extLst>
-              <a:ext uri="{FF2B5EF4-FFF2-40B4-BE49-F238E27FC236}">
-                <a16:creationId xmlns:a16="http://schemas.microsoft.com/office/drawing/2014/main" id="{5B75CF31-8755-3E42-B89A-9D67D96D7102}"/>
-              </a:ext>
-            </a:extLst>
-          </p:cNvPr>
-          <p:cNvSpPr>
-            <a:spLocks noGrp="1"/>
-          </p:cNvSpPr>
-          <p:nvPr>
-            <p:ph type="sldNum" sz="quarter" idx="12"/>
-          </p:nvPr>
-        </p:nvSpPr>
-        <p:spPr>
-          <a:xfrm>
-            <a:off x="838200" y="6004323"/>
-            <a:ext cx="2635332" cy="365125"/>
-          </a:xfrm>
-        </p:spPr>
-        <p:txBody>
-          <a:bodyPr/>
-          <a:lstStyle/>
-          <a:p>
-            <a:fld id="{B4E9AFF7-6653-6A4D-A979-64D2F5BECA26}" type="slidenum">
-              <a:rPr lang="en-US" smtClean="0"/>
-              <a:t>‹#›</a:t>
-            </a:fld>
-            <a:endParaRPr lang="en-US"/>
-          </a:p>
-        </p:txBody>
-      </p:sp>
-    </p:spTree>
-    <p:extLst>
-      <p:ext uri="{BB962C8B-B14F-4D97-AF65-F5344CB8AC3E}">
-        <p14:creationId xmlns:p14="http://schemas.microsoft.com/office/powerpoint/2010/main" val="306765995"/>
-      </p:ext>
-    </p:extLst>
-  </p:cSld>
-  <p:clrMapOvr>
-    <a:masterClrMapping/>
-  </p:clrMapOvr>
-</p:sldLayout>
-</file>
-
-<file path=ppt/slideLayouts/slideLayout3.xml><?xml version="1.0" encoding="utf-8"?>
-<p:sldLayout xmlns:a="http://schemas.openxmlformats.org/drawingml/2006/main" xmlns:r="http://schemas.openxmlformats.org/officeDocument/2006/relationships" xmlns:p="http://schemas.openxmlformats.org/presentationml/2006/main" type="secHead" preserve="1">
-  <p:cSld name="Section Header">
-    <p:spTree>
-      <p:nvGrpSpPr>
-        <p:cNvPr id="1" name=""/>
-        <p:cNvGrpSpPr/>
-        <p:nvPr/>
-      </p:nvGrpSpPr>
-      <p:grpSpPr>
-        <a:xfrm>
-          <a:off x="0" y="0"/>
-          <a:ext cx="0" cy="0"/>
-          <a:chOff x="0" y="0"/>
-          <a:chExt cx="0" cy="0"/>
-        </a:xfrm>
-      </p:grpSpPr>
-      <p:sp>
-        <p:nvSpPr>
-          <p:cNvPr id="2" name="Title 1">
-            <a:extLst>
-              <a:ext uri="{FF2B5EF4-FFF2-40B4-BE49-F238E27FC236}">
-                <a16:creationId xmlns:a16="http://schemas.microsoft.com/office/drawing/2014/main" id="{D1924E78-1993-A540-9F01-A28635FB4893}"/>
-              </a:ext>
-            </a:extLst>
-          </p:cNvPr>
-          <p:cNvSpPr>
-            <a:spLocks noGrp="1"/>
-          </p:cNvSpPr>
-          <p:nvPr>
-            <p:ph type="title" hasCustomPrompt="1"/>
-          </p:nvPr>
-        </p:nvSpPr>
-        <p:spPr>
-          <a:xfrm>
-            <a:off x="831850" y="1709738"/>
-            <a:ext cx="10515600" cy="2852737"/>
-          </a:xfrm>
-        </p:spPr>
-        <p:txBody>
-          <a:bodyPr anchor="b">
-            <a:normAutofit/>
-          </a:bodyPr>
-          <a:lstStyle>
-            <a:lvl1pPr>
-              <a:defRPr sz="3600" cap="none">
-                <a:latin typeface="+mj-lt"/>
-              </a:defRPr>
-            </a:lvl1pPr>
-          </a:lstStyle>
-          <a:p>
-            <a:r>
-              <a:rPr lang="en-US" dirty="0"/>
-              <a:t>Click to edit master title style</a:t>
-            </a:r>
-          </a:p>
-        </p:txBody>
-      </p:sp>
-      <p:sp>
-        <p:nvSpPr>
-          <p:cNvPr id="3" name="Text Placeholder 2">
-            <a:extLst>
-              <a:ext uri="{FF2B5EF4-FFF2-40B4-BE49-F238E27FC236}">
-                <a16:creationId xmlns:a16="http://schemas.microsoft.com/office/drawing/2014/main" id="{2EC1F37B-372F-0146-A20D-449355B25403}"/>
-              </a:ext>
-            </a:extLst>
-          </p:cNvPr>
-          <p:cNvSpPr>
-            <a:spLocks noGrp="1"/>
-          </p:cNvSpPr>
-          <p:nvPr>
-            <p:ph type="body" idx="1"/>
-          </p:nvPr>
-        </p:nvSpPr>
-        <p:spPr>
-          <a:xfrm>
-            <a:off x="831850" y="4589463"/>
-            <a:ext cx="10515600" cy="1201737"/>
-          </a:xfrm>
-        </p:spPr>
-        <p:txBody>
-          <a:bodyPr/>
-          <a:lstStyle>
-            <a:lvl1pPr marL="0" indent="0">
-              <a:buNone/>
-              <a:defRPr sz="2400">
-                <a:solidFill>
-                  <a:schemeClr val="tx1">
-                    <a:tint val="75000"/>
-                  </a:schemeClr>
-                </a:solidFill>
-              </a:defRPr>
-            </a:lvl1pPr>
-            <a:lvl2pPr marL="457200" indent="0">
-              <a:buNone/>
-              <a:defRPr sz="2000">
-                <a:solidFill>
-                  <a:schemeClr val="tx1">
-                    <a:tint val="75000"/>
-                  </a:schemeClr>
-                </a:solidFill>
-              </a:defRPr>
-            </a:lvl2pPr>
-            <a:lvl3pPr marL="914400" indent="0">
-              <a:buNone/>
-              <a:defRPr sz="1800">
-                <a:solidFill>
-                  <a:schemeClr val="tx1">
-                    <a:tint val="75000"/>
-                  </a:schemeClr>
-                </a:solidFill>
-              </a:defRPr>
-            </a:lvl3pPr>
-            <a:lvl4pPr marL="1371600" indent="0">
-              <a:buNone/>
-              <a:defRPr sz="1600">
-                <a:solidFill>
-                  <a:schemeClr val="tx1">
-                    <a:tint val="75000"/>
-                  </a:schemeClr>
-                </a:solidFill>
-              </a:defRPr>
-            </a:lvl4pPr>
-            <a:lvl5pPr marL="1828800" indent="0">
-              <a:buNone/>
-              <a:defRPr sz="1600">
-                <a:solidFill>
-                  <a:schemeClr val="tx1">
-                    <a:tint val="75000"/>
-                  </a:schemeClr>
-                </a:solidFill>
-              </a:defRPr>
-            </a:lvl5pPr>
-            <a:lvl6pPr marL="2286000" indent="0">
-              <a:buNone/>
-              <a:defRPr sz="1600">
-                <a:solidFill>
-                  <a:schemeClr val="tx1">
-                    <a:tint val="75000"/>
-                  </a:schemeClr>
-                </a:solidFill>
-              </a:defRPr>
-            </a:lvl6pPr>
-            <a:lvl7pPr marL="2743200" indent="0">
-              <a:buNone/>
-              <a:defRPr sz="1600">
-                <a:solidFill>
-                  <a:schemeClr val="tx1">
-                    <a:tint val="75000"/>
-                  </a:schemeClr>
-                </a:solidFill>
-              </a:defRPr>
-            </a:lvl7pPr>
-            <a:lvl8pPr marL="3200400" indent="0">
-              <a:buNone/>
-              <a:defRPr sz="1600">
-                <a:solidFill>
-                  <a:schemeClr val="tx1">
-                    <a:tint val="75000"/>
-                  </a:schemeClr>
-                </a:solidFill>
-              </a:defRPr>
-            </a:lvl8pPr>
-            <a:lvl9pPr marL="3657600" indent="0">
-              <a:buNone/>
-              <a:defRPr sz="1600">
-                <a:solidFill>
-                  <a:schemeClr val="tx1">
-                    <a:tint val="75000"/>
-                  </a:schemeClr>
-                </a:solidFill>
-              </a:defRPr>
-            </a:lvl9pPr>
-          </a:lstStyle>
-          <a:p>
-            <a:pPr lvl="0"/>
-            <a:r>
-              <a:rPr lang="en-US" dirty="0"/>
-              <a:t>Click to edit Master text styles</a:t>
-            </a:r>
-          </a:p>
-        </p:txBody>
-      </p:sp>
-      <p:sp>
-        <p:nvSpPr>
-          <p:cNvPr id="5" name="Footer Placeholder 4">
-            <a:extLst>
-              <a:ext uri="{FF2B5EF4-FFF2-40B4-BE49-F238E27FC236}">
-                <a16:creationId xmlns:a16="http://schemas.microsoft.com/office/drawing/2014/main" id="{87ADC64B-5CD5-7341-B6E0-9B4F677F9F9E}"/>
-              </a:ext>
-            </a:extLst>
-          </p:cNvPr>
-          <p:cNvSpPr>
-            <a:spLocks noGrp="1"/>
-          </p:cNvSpPr>
-          <p:nvPr>
-            <p:ph type="ftr" sz="quarter" idx="11"/>
-          </p:nvPr>
-        </p:nvSpPr>
-        <p:spPr/>
-        <p:txBody>
-          <a:bodyPr/>
-          <a:lstStyle/>
-          <a:p>
-            <a:endParaRPr lang="en-US"/>
-          </a:p>
-        </p:txBody>
-      </p:sp>
-      <p:sp>
-        <p:nvSpPr>
-          <p:cNvPr id="6" name="Slide Number Placeholder 5">
-            <a:extLst>
-              <a:ext uri="{FF2B5EF4-FFF2-40B4-BE49-F238E27FC236}">
-                <a16:creationId xmlns:a16="http://schemas.microsoft.com/office/drawing/2014/main" id="{AC918467-A91D-B840-9781-A402C93E7E3A}"/>
-              </a:ext>
-            </a:extLst>
-          </p:cNvPr>
-          <p:cNvSpPr>
-            <a:spLocks noGrp="1"/>
-          </p:cNvSpPr>
-          <p:nvPr>
-            <p:ph type="sldNum" sz="quarter" idx="12"/>
-          </p:nvPr>
-        </p:nvSpPr>
-        <p:spPr>
-          <a:xfrm>
-            <a:off x="838200" y="6004322"/>
-            <a:ext cx="2665021" cy="365125"/>
-          </a:xfrm>
-        </p:spPr>
-        <p:txBody>
-          <a:bodyPr/>
-          <a:lstStyle/>
-          <a:p>
-            <a:fld id="{B4E9AFF7-6653-6A4D-A979-64D2F5BECA26}" type="slidenum">
-              <a:rPr lang="en-US" smtClean="0"/>
-              <a:t>‹#›</a:t>
-            </a:fld>
-            <a:endParaRPr lang="en-US"/>
-          </a:p>
-        </p:txBody>
-      </p:sp>
-    </p:spTree>
-    <p:extLst>
-      <p:ext uri="{BB962C8B-B14F-4D97-AF65-F5344CB8AC3E}">
-        <p14:creationId xmlns:p14="http://schemas.microsoft.com/office/powerpoint/2010/main" val="3884017175"/>
-      </p:ext>
-    </p:extLst>
-  </p:cSld>
-  <p:clrMapOvr>
-    <a:masterClrMapping/>
-  </p:clrMapOvr>
-</p:sldLayout>
-</file>
-
-<file path=ppt/slideLayouts/slideLayout4.xml><?xml version="1.0" encoding="utf-8"?>
-<p:sldLayout xmlns:a="http://schemas.openxmlformats.org/drawingml/2006/main" xmlns:r="http://schemas.openxmlformats.org/officeDocument/2006/relationships" xmlns:p="http://schemas.openxmlformats.org/presentationml/2006/main" type="twoObj" preserve="1">
-  <p:cSld name="Two Content">
-    <p:spTree>
-      <p:nvGrpSpPr>
-        <p:cNvPr id="1" name=""/>
-        <p:cNvGrpSpPr/>
-        <p:nvPr/>
-      </p:nvGrpSpPr>
-      <p:grpSpPr>
-        <a:xfrm>
-          <a:off x="0" y="0"/>
-          <a:ext cx="0" cy="0"/>
-          <a:chOff x="0" y="0"/>
-          <a:chExt cx="0" cy="0"/>
-        </a:xfrm>
-      </p:grpSpPr>
-      <p:sp>
-        <p:nvSpPr>
-          <p:cNvPr id="2" name="Title 1">
-            <a:extLst>
-              <a:ext uri="{FF2B5EF4-FFF2-40B4-BE49-F238E27FC236}">
-                <a16:creationId xmlns:a16="http://schemas.microsoft.com/office/drawing/2014/main" id="{A2BBC8D6-6BCB-BD4B-B6E0-92A778004EF5}"/>
-              </a:ext>
-            </a:extLst>
-          </p:cNvPr>
-          <p:cNvSpPr>
-            <a:spLocks noGrp="1"/>
-          </p:cNvSpPr>
-          <p:nvPr>
-            <p:ph type="title" hasCustomPrompt="1"/>
-          </p:nvPr>
-        </p:nvSpPr>
-        <p:spPr/>
-        <p:txBody>
-          <a:bodyPr>
-            <a:normAutofit/>
-          </a:bodyPr>
-          <a:lstStyle>
-            <a:lvl1pPr>
-              <a:defRPr sz="3600" cap="none">
-                <a:latin typeface="+mj-lt"/>
-              </a:defRPr>
-            </a:lvl1pPr>
-          </a:lstStyle>
-          <a:p>
-            <a:r>
-              <a:rPr lang="en-US" dirty="0"/>
-              <a:t>Click to edit master title style</a:t>
-            </a:r>
-          </a:p>
-        </p:txBody>
-      </p:sp>
-      <p:sp>
-        <p:nvSpPr>
-          <p:cNvPr id="3" name="Content Placeholder 2">
-            <a:extLst>
-              <a:ext uri="{FF2B5EF4-FFF2-40B4-BE49-F238E27FC236}">
-                <a16:creationId xmlns:a16="http://schemas.microsoft.com/office/drawing/2014/main" id="{2BC4099C-8353-F44E-8406-26AC07974CEE}"/>
-              </a:ext>
-            </a:extLst>
-          </p:cNvPr>
-          <p:cNvSpPr>
-            <a:spLocks noGrp="1"/>
-          </p:cNvSpPr>
-          <p:nvPr>
-            <p:ph sz="half" idx="1"/>
-          </p:nvPr>
-        </p:nvSpPr>
-        <p:spPr>
-          <a:xfrm>
-            <a:off x="838200" y="1825625"/>
-            <a:ext cx="5181600" cy="4043761"/>
-          </a:xfrm>
-        </p:spPr>
-        <p:txBody>
-          <a:bodyPr/>
-          <a:lstStyle/>
-          <a:p>
-            <a:pPr lvl="0"/>
-            <a:r>
-              <a:rPr lang="en-US"/>
-              <a:t>Click to edit Master text styles</a:t>
-            </a:r>
-          </a:p>
-          <a:p>
-            <a:pPr lvl="1"/>
-            <a:r>
-              <a:rPr lang="en-US"/>
-              <a:t>Second level</a:t>
-            </a:r>
-          </a:p>
-          <a:p>
-            <a:pPr lvl="2"/>
-            <a:r>
-              <a:rPr lang="en-US"/>
-              <a:t>Third level</a:t>
-            </a:r>
-          </a:p>
-          <a:p>
-            <a:pPr lvl="3"/>
-            <a:r>
-              <a:rPr lang="en-US"/>
-              <a:t>Fourth level</a:t>
-            </a:r>
-          </a:p>
-          <a:p>
-            <a:pPr lvl="4"/>
-            <a:r>
-              <a:rPr lang="en-US"/>
-              <a:t>Fifth level</a:t>
-            </a:r>
-          </a:p>
-        </p:txBody>
-      </p:sp>
-      <p:sp>
-        <p:nvSpPr>
-          <p:cNvPr id="4" name="Content Placeholder 3">
-            <a:extLst>
-              <a:ext uri="{FF2B5EF4-FFF2-40B4-BE49-F238E27FC236}">
-                <a16:creationId xmlns:a16="http://schemas.microsoft.com/office/drawing/2014/main" id="{F8F8CC49-08EF-8048-B6B2-BC247008F046}"/>
-              </a:ext>
-            </a:extLst>
-          </p:cNvPr>
-          <p:cNvSpPr>
-            <a:spLocks noGrp="1"/>
-          </p:cNvSpPr>
-          <p:nvPr>
-            <p:ph sz="half" idx="2"/>
-          </p:nvPr>
-        </p:nvSpPr>
-        <p:spPr>
-          <a:xfrm>
-            <a:off x="6172200" y="1825625"/>
-            <a:ext cx="5181600" cy="4043761"/>
-          </a:xfrm>
-        </p:spPr>
-        <p:txBody>
-          <a:bodyPr/>
-          <a:lstStyle/>
-          <a:p>
-            <a:pPr lvl="0"/>
-            <a:r>
-              <a:rPr lang="en-US"/>
-              <a:t>Click to edit Master text styles</a:t>
-            </a:r>
-          </a:p>
-          <a:p>
-            <a:pPr lvl="1"/>
-            <a:r>
-              <a:rPr lang="en-US"/>
-              <a:t>Second level</a:t>
-            </a:r>
-          </a:p>
-          <a:p>
-            <a:pPr lvl="2"/>
-            <a:r>
-              <a:rPr lang="en-US"/>
-              <a:t>Third level</a:t>
-            </a:r>
-          </a:p>
-          <a:p>
-            <a:pPr lvl="3"/>
-            <a:r>
-              <a:rPr lang="en-US"/>
-              <a:t>Fourth level</a:t>
-            </a:r>
-          </a:p>
-          <a:p>
-            <a:pPr lvl="4"/>
-            <a:r>
-              <a:rPr lang="en-US"/>
-              <a:t>Fifth level</a:t>
-            </a:r>
-          </a:p>
-        </p:txBody>
-      </p:sp>
-      <p:sp>
-        <p:nvSpPr>
-          <p:cNvPr id="6" name="Footer Placeholder 5">
-            <a:extLst>
-              <a:ext uri="{FF2B5EF4-FFF2-40B4-BE49-F238E27FC236}">
-                <a16:creationId xmlns:a16="http://schemas.microsoft.com/office/drawing/2014/main" id="{82CCBEF1-4544-884E-86EB-5374139098CC}"/>
-              </a:ext>
-            </a:extLst>
-          </p:cNvPr>
-          <p:cNvSpPr>
-            <a:spLocks noGrp="1"/>
-          </p:cNvSpPr>
-          <p:nvPr>
-            <p:ph type="ftr" sz="quarter" idx="11"/>
-          </p:nvPr>
-        </p:nvSpPr>
-        <p:spPr/>
-        <p:txBody>
-          <a:bodyPr/>
-          <a:lstStyle/>
-          <a:p>
-            <a:endParaRPr lang="en-US"/>
-          </a:p>
-        </p:txBody>
-      </p:sp>
-      <p:sp>
-        <p:nvSpPr>
-          <p:cNvPr id="7" name="Slide Number Placeholder 6">
-            <a:extLst>
-              <a:ext uri="{FF2B5EF4-FFF2-40B4-BE49-F238E27FC236}">
-                <a16:creationId xmlns:a16="http://schemas.microsoft.com/office/drawing/2014/main" id="{5277F880-2CCE-9044-8CE8-A7CF47CE5236}"/>
-              </a:ext>
-            </a:extLst>
-          </p:cNvPr>
-          <p:cNvSpPr>
-            <a:spLocks noGrp="1"/>
-          </p:cNvSpPr>
-          <p:nvPr>
-            <p:ph type="sldNum" sz="quarter" idx="12"/>
-          </p:nvPr>
-        </p:nvSpPr>
-        <p:spPr>
-          <a:xfrm>
-            <a:off x="838200" y="6004323"/>
-            <a:ext cx="2688771" cy="365125"/>
-          </a:xfrm>
-        </p:spPr>
-        <p:txBody>
-          <a:bodyPr/>
-          <a:lstStyle/>
-          <a:p>
-            <a:fld id="{B4E9AFF7-6653-6A4D-A979-64D2F5BECA26}" type="slidenum">
-              <a:rPr lang="en-US" smtClean="0"/>
-              <a:t>‹#›</a:t>
-            </a:fld>
-            <a:endParaRPr lang="en-US"/>
-          </a:p>
-        </p:txBody>
-      </p:sp>
-    </p:spTree>
-    <p:extLst>
-      <p:ext uri="{BB962C8B-B14F-4D97-AF65-F5344CB8AC3E}">
-        <p14:creationId xmlns:p14="http://schemas.microsoft.com/office/powerpoint/2010/main" val="2524532774"/>
-      </p:ext>
-    </p:extLst>
-  </p:cSld>
-  <p:clrMapOvr>
-    <a:masterClrMapping/>
-  </p:clrMapOvr>
-</p:sldLayout>
-</file>
-
-<file path=ppt/slideLayouts/slideLayout5.xml><?xml version="1.0" encoding="utf-8"?>
-<p:sldLayout xmlns:a="http://schemas.openxmlformats.org/drawingml/2006/main" xmlns:r="http://schemas.openxmlformats.org/officeDocument/2006/relationships" xmlns:p="http://schemas.openxmlformats.org/presentationml/2006/main" type="twoTxTwoObj" preserve="1">
-  <p:cSld name="Comparison">
-    <p:spTree>
-      <p:nvGrpSpPr>
-        <p:cNvPr id="1" name=""/>
-        <p:cNvGrpSpPr/>
-        <p:nvPr/>
-      </p:nvGrpSpPr>
-      <p:grpSpPr>
-        <a:xfrm>
-          <a:off x="0" y="0"/>
-          <a:ext cx="0" cy="0"/>
-          <a:chOff x="0" y="0"/>
-          <a:chExt cx="0" cy="0"/>
-        </a:xfrm>
-      </p:grpSpPr>
-      <p:sp>
-        <p:nvSpPr>
-          <p:cNvPr id="2" name="Title 1">
-            <a:extLst>
-              <a:ext uri="{FF2B5EF4-FFF2-40B4-BE49-F238E27FC236}">
-                <a16:creationId xmlns:a16="http://schemas.microsoft.com/office/drawing/2014/main" id="{EEDCE802-B46A-204D-94D4-E50D913AEE83}"/>
-              </a:ext>
-            </a:extLst>
-          </p:cNvPr>
-          <p:cNvSpPr>
-            <a:spLocks noGrp="1"/>
-          </p:cNvSpPr>
-          <p:nvPr>
-            <p:ph type="title"/>
-          </p:nvPr>
-        </p:nvSpPr>
-        <p:spPr>
-          <a:xfrm>
-            <a:off x="839788" y="365125"/>
-            <a:ext cx="10515600" cy="1325563"/>
-          </a:xfrm>
-        </p:spPr>
-        <p:txBody>
-          <a:bodyPr>
-            <a:normAutofit/>
-          </a:bodyPr>
-          <a:lstStyle>
-            <a:lvl1pPr>
-              <a:defRPr sz="3600">
-                <a:latin typeface="+mj-lt"/>
-              </a:defRPr>
-            </a:lvl1pPr>
-          </a:lstStyle>
-          <a:p>
-            <a:r>
-              <a:rPr lang="en-US"/>
-              <a:t>Click to edit Master title style</a:t>
-            </a:r>
-          </a:p>
-        </p:txBody>
-      </p:sp>
-      <p:sp>
-        <p:nvSpPr>
-          <p:cNvPr id="3" name="Text Placeholder 2">
-            <a:extLst>
-              <a:ext uri="{FF2B5EF4-FFF2-40B4-BE49-F238E27FC236}">
-                <a16:creationId xmlns:a16="http://schemas.microsoft.com/office/drawing/2014/main" id="{6AD7812B-2A55-D049-A1C2-A4C973ACA5A3}"/>
-              </a:ext>
-            </a:extLst>
-          </p:cNvPr>
-          <p:cNvSpPr>
-            <a:spLocks noGrp="1"/>
-          </p:cNvSpPr>
-          <p:nvPr>
-            <p:ph type="body" idx="1"/>
-          </p:nvPr>
-        </p:nvSpPr>
-        <p:spPr>
-          <a:xfrm>
-            <a:off x="839788" y="1681163"/>
-            <a:ext cx="5157787" cy="823912"/>
-          </a:xfrm>
-        </p:spPr>
-        <p:txBody>
-          <a:bodyPr anchor="b"/>
-          <a:lstStyle>
-            <a:lvl1pPr marL="0" indent="0">
-              <a:buNone/>
-              <a:defRPr sz="2400" b="1"/>
-            </a:lvl1pPr>
-            <a:lvl2pPr marL="457200" indent="0">
-              <a:buNone/>
-              <a:defRPr sz="2000" b="1"/>
-            </a:lvl2pPr>
-            <a:lvl3pPr marL="914400" indent="0">
-              <a:buNone/>
-              <a:defRPr sz="1800" b="1"/>
-            </a:lvl3pPr>
-            <a:lvl4pPr marL="1371600" indent="0">
-              <a:buNone/>
-              <a:defRPr sz="1600" b="1"/>
-            </a:lvl4pPr>
-            <a:lvl5pPr marL="1828800" indent="0">
-              <a:buNone/>
-              <a:defRPr sz="1600" b="1"/>
-            </a:lvl5pPr>
-            <a:lvl6pPr marL="2286000" indent="0">
-              <a:buNone/>
-              <a:defRPr sz="1600" b="1"/>
-            </a:lvl6pPr>
-            <a:lvl7pPr marL="2743200" indent="0">
-              <a:buNone/>
-              <a:defRPr sz="1600" b="1"/>
-            </a:lvl7pPr>
-            <a:lvl8pPr marL="3200400" indent="0">
-              <a:buNone/>
-              <a:defRPr sz="1600" b="1"/>
-            </a:lvl8pPr>
-            <a:lvl9pPr marL="3657600" indent="0">
-              <a:buNone/>
-              <a:defRPr sz="1600" b="1"/>
-            </a:lvl9pPr>
-          </a:lstStyle>
-          <a:p>
-            <a:pPr lvl="0"/>
-            <a:r>
-              <a:rPr lang="en-US"/>
-              <a:t>Click to edit Master text styles</a:t>
-            </a:r>
-          </a:p>
-        </p:txBody>
-      </p:sp>
-      <p:sp>
-        <p:nvSpPr>
-          <p:cNvPr id="4" name="Content Placeholder 3">
-            <a:extLst>
-              <a:ext uri="{FF2B5EF4-FFF2-40B4-BE49-F238E27FC236}">
-                <a16:creationId xmlns:a16="http://schemas.microsoft.com/office/drawing/2014/main" id="{CD58766B-6B24-3B45-B55F-3D85F881F93D}"/>
-              </a:ext>
-            </a:extLst>
-          </p:cNvPr>
-          <p:cNvSpPr>
-            <a:spLocks noGrp="1"/>
-          </p:cNvSpPr>
-          <p:nvPr>
-            <p:ph sz="half" idx="2"/>
-          </p:nvPr>
-        </p:nvSpPr>
-        <p:spPr>
-          <a:xfrm>
-            <a:off x="839788" y="2505075"/>
-            <a:ext cx="5157787" cy="3392142"/>
-          </a:xfrm>
-        </p:spPr>
-        <p:txBody>
-          <a:bodyPr/>
-          <a:lstStyle/>
-          <a:p>
-            <a:pPr lvl="0"/>
-            <a:r>
-              <a:rPr lang="en-US"/>
-              <a:t>Click to edit Master text styles</a:t>
-            </a:r>
-          </a:p>
-          <a:p>
-            <a:pPr lvl="1"/>
-            <a:r>
-              <a:rPr lang="en-US"/>
-              <a:t>Second level</a:t>
-            </a:r>
-          </a:p>
-          <a:p>
-            <a:pPr lvl="2"/>
-            <a:r>
-              <a:rPr lang="en-US"/>
-              <a:t>Third level</a:t>
-            </a:r>
-          </a:p>
-          <a:p>
-            <a:pPr lvl="3"/>
-            <a:r>
-              <a:rPr lang="en-US"/>
-              <a:t>Fourth level</a:t>
-            </a:r>
-          </a:p>
-          <a:p>
-            <a:pPr lvl="4"/>
-            <a:r>
-              <a:rPr lang="en-US"/>
-              <a:t>Fifth level</a:t>
-            </a:r>
-          </a:p>
-        </p:txBody>
-      </p:sp>
-      <p:sp>
-        <p:nvSpPr>
-          <p:cNvPr id="5" name="Text Placeholder 4">
-            <a:extLst>
-              <a:ext uri="{FF2B5EF4-FFF2-40B4-BE49-F238E27FC236}">
-                <a16:creationId xmlns:a16="http://schemas.microsoft.com/office/drawing/2014/main" id="{D7A7F728-2418-1540-9191-5FDFA36D85FC}"/>
-              </a:ext>
-            </a:extLst>
-          </p:cNvPr>
-          <p:cNvSpPr>
-            <a:spLocks noGrp="1"/>
-          </p:cNvSpPr>
-          <p:nvPr>
-            <p:ph type="body" sz="quarter" idx="3"/>
-          </p:nvPr>
-        </p:nvSpPr>
-        <p:spPr>
-          <a:xfrm>
-            <a:off x="6172200" y="1681163"/>
-            <a:ext cx="5183188" cy="823912"/>
-          </a:xfrm>
-        </p:spPr>
-        <p:txBody>
-          <a:bodyPr anchor="b"/>
-          <a:lstStyle>
-            <a:lvl1pPr marL="0" indent="0">
-              <a:buNone/>
-              <a:defRPr sz="2400" b="1"/>
-            </a:lvl1pPr>
-            <a:lvl2pPr marL="457200" indent="0">
-              <a:buNone/>
-              <a:defRPr sz="2000" b="1"/>
-            </a:lvl2pPr>
-            <a:lvl3pPr marL="914400" indent="0">
-              <a:buNone/>
-              <a:defRPr sz="1800" b="1"/>
-            </a:lvl3pPr>
-            <a:lvl4pPr marL="1371600" indent="0">
-              <a:buNone/>
-              <a:defRPr sz="1600" b="1"/>
-            </a:lvl4pPr>
-            <a:lvl5pPr marL="1828800" indent="0">
-              <a:buNone/>
-              <a:defRPr sz="1600" b="1"/>
-            </a:lvl5pPr>
-            <a:lvl6pPr marL="2286000" indent="0">
-              <a:buNone/>
-              <a:defRPr sz="1600" b="1"/>
-            </a:lvl6pPr>
-            <a:lvl7pPr marL="2743200" indent="0">
-              <a:buNone/>
-              <a:defRPr sz="1600" b="1"/>
-            </a:lvl7pPr>
-            <a:lvl8pPr marL="3200400" indent="0">
-              <a:buNone/>
-              <a:defRPr sz="1600" b="1"/>
-            </a:lvl8pPr>
-            <a:lvl9pPr marL="3657600" indent="0">
-              <a:buNone/>
-              <a:defRPr sz="1600" b="1"/>
-            </a:lvl9pPr>
-          </a:lstStyle>
-          <a:p>
-            <a:pPr lvl="0"/>
-            <a:r>
-              <a:rPr lang="en-US"/>
-              <a:t>Click to edit Master text styles</a:t>
-            </a:r>
-          </a:p>
-        </p:txBody>
-      </p:sp>
-      <p:sp>
-        <p:nvSpPr>
-          <p:cNvPr id="6" name="Content Placeholder 5">
-            <a:extLst>
-              <a:ext uri="{FF2B5EF4-FFF2-40B4-BE49-F238E27FC236}">
-                <a16:creationId xmlns:a16="http://schemas.microsoft.com/office/drawing/2014/main" id="{A7948585-BFC1-9148-A0B5-07C83C2F21BA}"/>
-              </a:ext>
-            </a:extLst>
-          </p:cNvPr>
-          <p:cNvSpPr>
-            <a:spLocks noGrp="1"/>
-          </p:cNvSpPr>
-          <p:nvPr>
-            <p:ph sz="quarter" idx="4"/>
-          </p:nvPr>
-        </p:nvSpPr>
-        <p:spPr>
-          <a:xfrm>
-            <a:off x="6172200" y="2505075"/>
-            <a:ext cx="5183188" cy="3392142"/>
-          </a:xfrm>
-        </p:spPr>
-        <p:txBody>
-          <a:bodyPr/>
-          <a:lstStyle/>
-          <a:p>
-            <a:pPr lvl="0"/>
-            <a:r>
-              <a:rPr lang="en-US"/>
-              <a:t>Click to edit Master text styles</a:t>
-            </a:r>
-          </a:p>
-          <a:p>
-            <a:pPr lvl="1"/>
-            <a:r>
-              <a:rPr lang="en-US"/>
-              <a:t>Second level</a:t>
-            </a:r>
-          </a:p>
-          <a:p>
-            <a:pPr lvl="2"/>
-            <a:r>
-              <a:rPr lang="en-US"/>
-              <a:t>Third level</a:t>
-            </a:r>
-          </a:p>
-          <a:p>
-            <a:pPr lvl="3"/>
-            <a:r>
-              <a:rPr lang="en-US"/>
-              <a:t>Fourth level</a:t>
-            </a:r>
-          </a:p>
-          <a:p>
-            <a:pPr lvl="4"/>
-            <a:r>
-              <a:rPr lang="en-US"/>
-              <a:t>Fifth level</a:t>
-            </a:r>
-          </a:p>
-        </p:txBody>
-      </p:sp>
-      <p:sp>
-        <p:nvSpPr>
-          <p:cNvPr id="8" name="Footer Placeholder 7">
-            <a:extLst>
-              <a:ext uri="{FF2B5EF4-FFF2-40B4-BE49-F238E27FC236}">
-                <a16:creationId xmlns:a16="http://schemas.microsoft.com/office/drawing/2014/main" id="{BD1371BF-1A9F-5641-95DB-6C0FE67BBB93}"/>
-              </a:ext>
-            </a:extLst>
-          </p:cNvPr>
-          <p:cNvSpPr>
-            <a:spLocks noGrp="1"/>
-          </p:cNvSpPr>
-          <p:nvPr>
-            <p:ph type="ftr" sz="quarter" idx="11"/>
-          </p:nvPr>
-        </p:nvSpPr>
-        <p:spPr/>
-        <p:txBody>
-          <a:bodyPr/>
-          <a:lstStyle/>
-          <a:p>
-            <a:endParaRPr lang="en-US"/>
-          </a:p>
-        </p:txBody>
-      </p:sp>
-      <p:sp>
-        <p:nvSpPr>
-          <p:cNvPr id="9" name="Slide Number Placeholder 8">
-            <a:extLst>
-              <a:ext uri="{FF2B5EF4-FFF2-40B4-BE49-F238E27FC236}">
-                <a16:creationId xmlns:a16="http://schemas.microsoft.com/office/drawing/2014/main" id="{21121846-D4EB-5949-B8F3-E40099164899}"/>
-              </a:ext>
-            </a:extLst>
-          </p:cNvPr>
-          <p:cNvSpPr>
-            <a:spLocks noGrp="1"/>
-          </p:cNvSpPr>
-          <p:nvPr>
-            <p:ph type="sldNum" sz="quarter" idx="12"/>
-          </p:nvPr>
-        </p:nvSpPr>
-        <p:spPr>
-          <a:xfrm>
-            <a:off x="838200" y="6004323"/>
-            <a:ext cx="2682834" cy="365125"/>
-          </a:xfrm>
-        </p:spPr>
-        <p:txBody>
-          <a:bodyPr/>
-          <a:lstStyle/>
-          <a:p>
-            <a:fld id="{B4E9AFF7-6653-6A4D-A979-64D2F5BECA26}" type="slidenum">
-              <a:rPr lang="en-US" smtClean="0"/>
-              <a:t>‹#›</a:t>
-            </a:fld>
-            <a:endParaRPr lang="en-US"/>
-          </a:p>
-        </p:txBody>
-      </p:sp>
-    </p:spTree>
-    <p:extLst>
-      <p:ext uri="{BB962C8B-B14F-4D97-AF65-F5344CB8AC3E}">
-        <p14:creationId xmlns:p14="http://schemas.microsoft.com/office/powerpoint/2010/main" val="164583023"/>
-      </p:ext>
-    </p:extLst>
-  </p:cSld>
-  <p:clrMapOvr>
-    <a:masterClrMapping/>
-  </p:clrMapOvr>
-</p:sldLayout>
-</file>
-
-<file path=ppt/slideLayouts/slideLayout6.xml><?xml version="1.0" encoding="utf-8"?>
-<p:sldLayout xmlns:a="http://schemas.openxmlformats.org/drawingml/2006/main" xmlns:r="http://schemas.openxmlformats.org/officeDocument/2006/relationships" xmlns:p="http://schemas.openxmlformats.org/presentationml/2006/main" type="titleOnly" preserve="1">
-  <p:cSld name="Title Only">
-    <p:spTree>
-      <p:nvGrpSpPr>
-        <p:cNvPr id="1" name=""/>
-        <p:cNvGrpSpPr/>
-        <p:nvPr/>
-      </p:nvGrpSpPr>
-      <p:grpSpPr>
-        <a:xfrm>
-          <a:off x="0" y="0"/>
-          <a:ext cx="0" cy="0"/>
-          <a:chOff x="0" y="0"/>
-          <a:chExt cx="0" cy="0"/>
-        </a:xfrm>
-      </p:grpSpPr>
-      <p:sp>
-        <p:nvSpPr>
-          <p:cNvPr id="2" name="Title 1">
-            <a:extLst>
-              <a:ext uri="{FF2B5EF4-FFF2-40B4-BE49-F238E27FC236}">
-                <a16:creationId xmlns:a16="http://schemas.microsoft.com/office/drawing/2014/main" id="{5AE59A27-C210-CF48-97F8-943B5EBAC6EC}"/>
-              </a:ext>
-            </a:extLst>
-          </p:cNvPr>
-          <p:cNvSpPr>
-            <a:spLocks noGrp="1"/>
-          </p:cNvSpPr>
-          <p:nvPr>
-            <p:ph type="title" hasCustomPrompt="1"/>
-          </p:nvPr>
-        </p:nvSpPr>
-        <p:spPr/>
-        <p:txBody>
-          <a:bodyPr>
-            <a:normAutofit/>
-          </a:bodyPr>
-          <a:lstStyle>
-            <a:lvl1pPr>
-              <a:defRPr sz="3600" cap="none">
-                <a:latin typeface="+mj-lt"/>
-              </a:defRPr>
-            </a:lvl1pPr>
-          </a:lstStyle>
-          <a:p>
-            <a:r>
-              <a:rPr lang="en-US" dirty="0"/>
-              <a:t>Click to edit master title style</a:t>
-            </a:r>
-          </a:p>
-        </p:txBody>
-      </p:sp>
-      <p:sp>
-        <p:nvSpPr>
-          <p:cNvPr id="4" name="Footer Placeholder 3">
-            <a:extLst>
-              <a:ext uri="{FF2B5EF4-FFF2-40B4-BE49-F238E27FC236}">
-                <a16:creationId xmlns:a16="http://schemas.microsoft.com/office/drawing/2014/main" id="{385EC86A-0D15-764F-AA81-41016E208EA3}"/>
-              </a:ext>
-            </a:extLst>
-          </p:cNvPr>
-          <p:cNvSpPr>
-            <a:spLocks noGrp="1"/>
-          </p:cNvSpPr>
-          <p:nvPr>
-            <p:ph type="ftr" sz="quarter" idx="11"/>
-          </p:nvPr>
-        </p:nvSpPr>
-        <p:spPr/>
-        <p:txBody>
-          <a:bodyPr/>
-          <a:lstStyle/>
-          <a:p>
-            <a:endParaRPr lang="en-US"/>
-          </a:p>
-        </p:txBody>
-      </p:sp>
-      <p:sp>
-        <p:nvSpPr>
-          <p:cNvPr id="5" name="Slide Number Placeholder 4">
-            <a:extLst>
-              <a:ext uri="{FF2B5EF4-FFF2-40B4-BE49-F238E27FC236}">
-                <a16:creationId xmlns:a16="http://schemas.microsoft.com/office/drawing/2014/main" id="{9B633FAA-B5EA-C54D-A18B-17F16CA5F110}"/>
-              </a:ext>
-            </a:extLst>
-          </p:cNvPr>
-          <p:cNvSpPr>
-            <a:spLocks noGrp="1"/>
-          </p:cNvSpPr>
-          <p:nvPr>
-            <p:ph type="sldNum" sz="quarter" idx="12"/>
-          </p:nvPr>
-        </p:nvSpPr>
-        <p:spPr>
-          <a:xfrm>
-            <a:off x="838200" y="6005974"/>
-            <a:ext cx="2670958" cy="365125"/>
-          </a:xfrm>
-        </p:spPr>
-        <p:txBody>
-          <a:bodyPr/>
-          <a:lstStyle/>
-          <a:p>
-            <a:fld id="{B4E9AFF7-6653-6A4D-A979-64D2F5BECA26}" type="slidenum">
-              <a:rPr lang="en-US" smtClean="0"/>
-              <a:t>‹#›</a:t>
-            </a:fld>
-            <a:endParaRPr lang="en-US"/>
-          </a:p>
-        </p:txBody>
-      </p:sp>
-    </p:spTree>
-    <p:extLst>
-      <p:ext uri="{BB962C8B-B14F-4D97-AF65-F5344CB8AC3E}">
-        <p14:creationId xmlns:p14="http://schemas.microsoft.com/office/powerpoint/2010/main" val="2971224310"/>
-      </p:ext>
-    </p:extLst>
-  </p:cSld>
-  <p:clrMapOvr>
-    <a:masterClrMapping/>
-  </p:clrMapOvr>
-</p:sldLayout>
-</file>
-
-<file path=ppt/slideLayouts/slideLayout7.xml><?xml version="1.0" encoding="utf-8"?>
-<p:sldLayout xmlns:a="http://schemas.openxmlformats.org/drawingml/2006/main" xmlns:r="http://schemas.openxmlformats.org/officeDocument/2006/relationships" xmlns:p="http://schemas.openxmlformats.org/presentationml/2006/main" preserve="1" userDrawn="1">
-  <p:cSld name="Blank">
-    <p:spTree>
-      <p:nvGrpSpPr>
-        <p:cNvPr id="1" name=""/>
-        <p:cNvGrpSpPr/>
-        <p:nvPr/>
-      </p:nvGrpSpPr>
-      <p:grpSpPr>
-        <a:xfrm>
-          <a:off x="0" y="0"/>
-          <a:ext cx="0" cy="0"/>
-          <a:chOff x="0" y="0"/>
-          <a:chExt cx="0" cy="0"/>
-        </a:xfrm>
-      </p:grpSpPr>
-      <p:sp>
-        <p:nvSpPr>
-          <p:cNvPr id="5" name="Title 1">
-            <a:extLst>
-              <a:ext uri="{FF2B5EF4-FFF2-40B4-BE49-F238E27FC236}">
-                <a16:creationId xmlns:a16="http://schemas.microsoft.com/office/drawing/2014/main" id="{D5675641-0B7A-F548-B3B6-241BCE86DE22}"/>
-              </a:ext>
-            </a:extLst>
-          </p:cNvPr>
-          <p:cNvSpPr>
-            <a:spLocks noGrp="1"/>
-          </p:cNvSpPr>
-          <p:nvPr>
-            <p:ph type="title"/>
-          </p:nvPr>
-        </p:nvSpPr>
-        <p:spPr>
-          <a:xfrm>
-            <a:off x="-1044" y="-1414307"/>
-            <a:ext cx="10515600" cy="1325563"/>
-          </a:xfrm>
-        </p:spPr>
-        <p:txBody>
-          <a:bodyPr/>
-          <a:lstStyle/>
-          <a:p>
-            <a:r>
-              <a:rPr lang="en-US"/>
-              <a:t>Click to edit Master title style</a:t>
-            </a:r>
-            <a:endParaRPr lang="en-US" dirty="0"/>
-          </a:p>
-        </p:txBody>
-      </p:sp>
-      <p:sp>
-        <p:nvSpPr>
-          <p:cNvPr id="3" name="Footer Placeholder 2">
-            <a:extLst>
-              <a:ext uri="{FF2B5EF4-FFF2-40B4-BE49-F238E27FC236}">
-                <a16:creationId xmlns:a16="http://schemas.microsoft.com/office/drawing/2014/main" id="{7AE991BC-E157-B340-860E-81A4EBD04B28}"/>
-              </a:ext>
-            </a:extLst>
-          </p:cNvPr>
-          <p:cNvSpPr>
-            <a:spLocks noGrp="1"/>
-          </p:cNvSpPr>
-          <p:nvPr>
-            <p:ph type="ftr" sz="quarter" idx="11"/>
-          </p:nvPr>
-        </p:nvSpPr>
-        <p:spPr/>
-        <p:txBody>
-          <a:bodyPr/>
-          <a:lstStyle/>
-          <a:p>
-            <a:endParaRPr lang="en-US"/>
-          </a:p>
-        </p:txBody>
-      </p:sp>
-      <p:sp>
-        <p:nvSpPr>
-          <p:cNvPr id="4" name="Slide Number Placeholder 3">
-            <a:extLst>
-              <a:ext uri="{FF2B5EF4-FFF2-40B4-BE49-F238E27FC236}">
-                <a16:creationId xmlns:a16="http://schemas.microsoft.com/office/drawing/2014/main" id="{426805CF-1707-5749-8109-20FA44953EE0}"/>
-              </a:ext>
-            </a:extLst>
-          </p:cNvPr>
-          <p:cNvSpPr>
-            <a:spLocks noGrp="1"/>
-          </p:cNvSpPr>
-          <p:nvPr>
-            <p:ph type="sldNum" sz="quarter" idx="12"/>
-          </p:nvPr>
-        </p:nvSpPr>
-        <p:spPr>
-          <a:xfrm>
-            <a:off x="838200" y="6004322"/>
-            <a:ext cx="2605644" cy="365125"/>
-          </a:xfrm>
-        </p:spPr>
-        <p:txBody>
-          <a:bodyPr/>
-          <a:lstStyle/>
-          <a:p>
-            <a:fld id="{B4E9AFF7-6653-6A4D-A979-64D2F5BECA26}" type="slidenum">
-              <a:rPr lang="en-US" smtClean="0"/>
-              <a:t>‹#›</a:t>
-            </a:fld>
-            <a:endParaRPr lang="en-US"/>
-          </a:p>
-        </p:txBody>
-      </p:sp>
-    </p:spTree>
-    <p:extLst>
-      <p:ext uri="{BB962C8B-B14F-4D97-AF65-F5344CB8AC3E}">
-        <p14:creationId xmlns:p14="http://schemas.microsoft.com/office/powerpoint/2010/main" val="694746482"/>
-      </p:ext>
-    </p:extLst>
-  </p:cSld>
-  <p:clrMapOvr>
-    <a:masterClrMapping/>
-  </p:clrMapOvr>
-</p:sldLayout>
-</file>
-
-<file path=ppt/slideLayouts/slideLayout8.xml><?xml version="1.0" encoding="utf-8"?>
-<p:sldLayout xmlns:a="http://schemas.openxmlformats.org/drawingml/2006/main" xmlns:r="http://schemas.openxmlformats.org/officeDocument/2006/relationships" xmlns:p="http://schemas.openxmlformats.org/presentationml/2006/main" type="objTx" preserve="1">
-  <p:cSld name="Content with Caption">
-    <p:spTree>
-      <p:nvGrpSpPr>
-        <p:cNvPr id="1" name=""/>
-        <p:cNvGrpSpPr/>
-        <p:nvPr/>
-      </p:nvGrpSpPr>
-      <p:grpSpPr>
-        <a:xfrm>
-          <a:off x="0" y="0"/>
-          <a:ext cx="0" cy="0"/>
-          <a:chOff x="0" y="0"/>
-          <a:chExt cx="0" cy="0"/>
-        </a:xfrm>
-      </p:grpSpPr>
-      <p:sp>
-        <p:nvSpPr>
-          <p:cNvPr id="2" name="Title 1">
-            <a:extLst>
-              <a:ext uri="{FF2B5EF4-FFF2-40B4-BE49-F238E27FC236}">
-                <a16:creationId xmlns:a16="http://schemas.microsoft.com/office/drawing/2014/main" id="{7EB654A1-6207-5141-AAB1-9A7630DA988E}"/>
-              </a:ext>
-            </a:extLst>
-          </p:cNvPr>
-          <p:cNvSpPr>
-            <a:spLocks noGrp="1"/>
-          </p:cNvSpPr>
-          <p:nvPr>
-            <p:ph type="title" hasCustomPrompt="1"/>
-          </p:nvPr>
-        </p:nvSpPr>
-        <p:spPr>
-          <a:xfrm>
-            <a:off x="839788" y="457200"/>
-            <a:ext cx="3932237" cy="1600200"/>
-          </a:xfrm>
-        </p:spPr>
-        <p:txBody>
-          <a:bodyPr anchor="b">
-            <a:normAutofit/>
-          </a:bodyPr>
-          <a:lstStyle>
-            <a:lvl1pPr>
-              <a:defRPr sz="3600" cap="none">
-                <a:latin typeface="+mj-lt"/>
-              </a:defRPr>
-            </a:lvl1pPr>
-          </a:lstStyle>
-          <a:p>
-            <a:r>
-              <a:rPr lang="en-US" dirty="0"/>
-              <a:t>Click to edit master title style</a:t>
-            </a:r>
-          </a:p>
-        </p:txBody>
-      </p:sp>
-      <p:sp>
-        <p:nvSpPr>
-          <p:cNvPr id="3" name="Content Placeholder 2">
-            <a:extLst>
-              <a:ext uri="{FF2B5EF4-FFF2-40B4-BE49-F238E27FC236}">
-                <a16:creationId xmlns:a16="http://schemas.microsoft.com/office/drawing/2014/main" id="{6D39F95B-0887-9F4F-BA1C-0B9CBE5AED2F}"/>
-              </a:ext>
-            </a:extLst>
-          </p:cNvPr>
-          <p:cNvSpPr>
-            <a:spLocks noGrp="1"/>
-          </p:cNvSpPr>
-          <p:nvPr>
-            <p:ph idx="1"/>
-          </p:nvPr>
-        </p:nvSpPr>
-        <p:spPr>
-          <a:xfrm>
-            <a:off x="5183188" y="987425"/>
-            <a:ext cx="6172200" cy="4873625"/>
-          </a:xfrm>
-        </p:spPr>
-        <p:txBody>
-          <a:bodyPr/>
-          <a:lstStyle>
-            <a:lvl1pPr>
-              <a:defRPr sz="3200"/>
-            </a:lvl1pPr>
-            <a:lvl2pPr>
-              <a:defRPr sz="2800"/>
-            </a:lvl2pPr>
-            <a:lvl3pPr>
-              <a:defRPr sz="2400"/>
-            </a:lvl3pPr>
-            <a:lvl4pPr>
-              <a:defRPr sz="2000"/>
-            </a:lvl4pPr>
-            <a:lvl5pPr>
-              <a:defRPr sz="2000"/>
-            </a:lvl5pPr>
-            <a:lvl6pPr>
-              <a:defRPr sz="2000"/>
-            </a:lvl6pPr>
-            <a:lvl7pPr>
-              <a:defRPr sz="2000"/>
-            </a:lvl7pPr>
-            <a:lvl8pPr>
-              <a:defRPr sz="2000"/>
-            </a:lvl8pPr>
-            <a:lvl9pPr>
-              <a:defRPr sz="2000"/>
-            </a:lvl9pPr>
-          </a:lstStyle>
-          <a:p>
-            <a:pPr lvl="0"/>
-            <a:r>
-              <a:rPr lang="en-US"/>
-              <a:t>Click to edit Master text styles</a:t>
-            </a:r>
-          </a:p>
-          <a:p>
-            <a:pPr lvl="1"/>
-            <a:r>
-              <a:rPr lang="en-US"/>
-              <a:t>Second level</a:t>
-            </a:r>
-          </a:p>
-          <a:p>
-            <a:pPr lvl="2"/>
-            <a:r>
-              <a:rPr lang="en-US"/>
-              <a:t>Third level</a:t>
-            </a:r>
-          </a:p>
-          <a:p>
-            <a:pPr lvl="3"/>
-            <a:r>
-              <a:rPr lang="en-US"/>
-              <a:t>Fourth level</a:t>
-            </a:r>
-          </a:p>
-          <a:p>
-            <a:pPr lvl="4"/>
-            <a:r>
-              <a:rPr lang="en-US"/>
-              <a:t>Fifth level</a:t>
-            </a:r>
-          </a:p>
-        </p:txBody>
-      </p:sp>
-      <p:sp>
-        <p:nvSpPr>
-          <p:cNvPr id="4" name="Text Placeholder 3">
-            <a:extLst>
-              <a:ext uri="{FF2B5EF4-FFF2-40B4-BE49-F238E27FC236}">
-                <a16:creationId xmlns:a16="http://schemas.microsoft.com/office/drawing/2014/main" id="{6D6515B1-8A32-AB43-82F2-51A60BC2E388}"/>
-              </a:ext>
-            </a:extLst>
-          </p:cNvPr>
-          <p:cNvSpPr>
-            <a:spLocks noGrp="1"/>
-          </p:cNvSpPr>
-          <p:nvPr>
-            <p:ph type="body" sz="half" idx="2"/>
-          </p:nvPr>
-        </p:nvSpPr>
-        <p:spPr>
-          <a:xfrm>
-            <a:off x="839788" y="2057400"/>
-            <a:ext cx="3932237" cy="3811588"/>
-          </a:xfrm>
-        </p:spPr>
-        <p:txBody>
-          <a:bodyPr/>
-          <a:lstStyle>
-            <a:lvl1pPr marL="0" indent="0">
-              <a:buNone/>
-              <a:defRPr sz="1600"/>
-            </a:lvl1pPr>
-            <a:lvl2pPr marL="457200" indent="0">
-              <a:buNone/>
-              <a:defRPr sz="1400"/>
-            </a:lvl2pPr>
-            <a:lvl3pPr marL="914400" indent="0">
-              <a:buNone/>
-              <a:defRPr sz="1200"/>
-            </a:lvl3pPr>
-            <a:lvl4pPr marL="1371600" indent="0">
-              <a:buNone/>
-              <a:defRPr sz="1000"/>
-            </a:lvl4pPr>
-            <a:lvl5pPr marL="1828800" indent="0">
-              <a:buNone/>
-              <a:defRPr sz="1000"/>
-            </a:lvl5pPr>
-            <a:lvl6pPr marL="2286000" indent="0">
-              <a:buNone/>
-              <a:defRPr sz="1000"/>
-            </a:lvl6pPr>
-            <a:lvl7pPr marL="2743200" indent="0">
-              <a:buNone/>
-              <a:defRPr sz="1000"/>
-            </a:lvl7pPr>
-            <a:lvl8pPr marL="3200400" indent="0">
-              <a:buNone/>
-              <a:defRPr sz="1000"/>
-            </a:lvl8pPr>
-            <a:lvl9pPr marL="3657600" indent="0">
-              <a:buNone/>
-              <a:defRPr sz="1000"/>
-            </a:lvl9pPr>
-          </a:lstStyle>
-          <a:p>
-            <a:pPr lvl="0"/>
-            <a:r>
-              <a:rPr lang="en-US"/>
-              <a:t>Click to edit Master text styles</a:t>
-            </a:r>
-          </a:p>
-        </p:txBody>
-      </p:sp>
-      <p:sp>
-        <p:nvSpPr>
-          <p:cNvPr id="6" name="Footer Placeholder 5">
-            <a:extLst>
-              <a:ext uri="{FF2B5EF4-FFF2-40B4-BE49-F238E27FC236}">
-                <a16:creationId xmlns:a16="http://schemas.microsoft.com/office/drawing/2014/main" id="{5FC3D973-68F9-5B46-A3D8-B7AF20B00EAB}"/>
-              </a:ext>
-            </a:extLst>
-          </p:cNvPr>
-          <p:cNvSpPr>
-            <a:spLocks noGrp="1"/>
-          </p:cNvSpPr>
-          <p:nvPr>
-            <p:ph type="ftr" sz="quarter" idx="11"/>
-          </p:nvPr>
-        </p:nvSpPr>
-        <p:spPr/>
-        <p:txBody>
-          <a:bodyPr/>
-          <a:lstStyle/>
-          <a:p>
-            <a:endParaRPr lang="en-US"/>
-          </a:p>
-        </p:txBody>
-      </p:sp>
-      <p:sp>
-        <p:nvSpPr>
-          <p:cNvPr id="7" name="Slide Number Placeholder 6">
-            <a:extLst>
-              <a:ext uri="{FF2B5EF4-FFF2-40B4-BE49-F238E27FC236}">
-                <a16:creationId xmlns:a16="http://schemas.microsoft.com/office/drawing/2014/main" id="{F4AA68CE-A588-FE4D-9C1E-5BE4A1A82F81}"/>
-              </a:ext>
-            </a:extLst>
-          </p:cNvPr>
-          <p:cNvSpPr>
-            <a:spLocks noGrp="1"/>
-          </p:cNvSpPr>
-          <p:nvPr>
-            <p:ph type="sldNum" sz="quarter" idx="12"/>
-          </p:nvPr>
-        </p:nvSpPr>
-        <p:spPr>
-          <a:xfrm>
-            <a:off x="838200" y="6004323"/>
-            <a:ext cx="2670958" cy="365125"/>
-          </a:xfrm>
-        </p:spPr>
-        <p:txBody>
-          <a:bodyPr/>
-          <a:lstStyle/>
-          <a:p>
-            <a:fld id="{B4E9AFF7-6653-6A4D-A979-64D2F5BECA26}" type="slidenum">
-              <a:rPr lang="en-US" smtClean="0"/>
-              <a:t>‹#›</a:t>
-            </a:fld>
-            <a:endParaRPr lang="en-US"/>
-          </a:p>
-        </p:txBody>
-      </p:sp>
-    </p:spTree>
-    <p:extLst>
-      <p:ext uri="{BB962C8B-B14F-4D97-AF65-F5344CB8AC3E}">
-        <p14:creationId xmlns:p14="http://schemas.microsoft.com/office/powerpoint/2010/main" val="2948330272"/>
-      </p:ext>
-    </p:extLst>
-  </p:cSld>
-  <p:clrMapOvr>
-    <a:masterClrMapping/>
-  </p:clrMapOvr>
-</p:sldLayout>
-</file>
-
-<file path=ppt/slideLayouts/slideLayout9.xml><?xml version="1.0" encoding="utf-8"?>
-<p:sldLayout xmlns:a="http://schemas.openxmlformats.org/drawingml/2006/main" xmlns:r="http://schemas.openxmlformats.org/officeDocument/2006/relationships" xmlns:p="http://schemas.openxmlformats.org/presentationml/2006/main" type="picTx" preserve="1">
-  <p:cSld name="Picture with Caption">
-    <p:spTree>
-      <p:nvGrpSpPr>
-        <p:cNvPr id="1" name=""/>
-        <p:cNvGrpSpPr/>
-        <p:nvPr/>
-      </p:nvGrpSpPr>
-      <p:grpSpPr>
-        <a:xfrm>
-          <a:off x="0" y="0"/>
-          <a:ext cx="0" cy="0"/>
-          <a:chOff x="0" y="0"/>
-          <a:chExt cx="0" cy="0"/>
-        </a:xfrm>
-      </p:grpSpPr>
-      <p:sp>
-        <p:nvSpPr>
-          <p:cNvPr id="2" name="Title 1">
-            <a:extLst>
-              <a:ext uri="{FF2B5EF4-FFF2-40B4-BE49-F238E27FC236}">
-                <a16:creationId xmlns:a16="http://schemas.microsoft.com/office/drawing/2014/main" id="{BBA75185-7056-B946-8F27-7890BB2A3456}"/>
-              </a:ext>
-            </a:extLst>
-          </p:cNvPr>
-          <p:cNvSpPr>
-            <a:spLocks noGrp="1"/>
-          </p:cNvSpPr>
-          <p:nvPr>
-            <p:ph type="title" hasCustomPrompt="1"/>
-          </p:nvPr>
-        </p:nvSpPr>
-        <p:spPr>
-          <a:xfrm>
-            <a:off x="839788" y="457200"/>
-            <a:ext cx="3932237" cy="1600200"/>
-          </a:xfrm>
-        </p:spPr>
-        <p:txBody>
-          <a:bodyPr anchor="b">
-            <a:normAutofit/>
-          </a:bodyPr>
-          <a:lstStyle>
-            <a:lvl1pPr>
-              <a:defRPr sz="3600" cap="none">
-                <a:latin typeface="+mj-lt"/>
-              </a:defRPr>
-            </a:lvl1pPr>
-          </a:lstStyle>
-          <a:p>
-            <a:r>
-              <a:rPr lang="en-US" dirty="0"/>
-              <a:t>Click to edit master title style</a:t>
-            </a:r>
-          </a:p>
-        </p:txBody>
-      </p:sp>
-      <p:sp>
-        <p:nvSpPr>
-          <p:cNvPr id="3" name="Picture Placeholder 2">
-            <a:extLst>
-              <a:ext uri="{FF2B5EF4-FFF2-40B4-BE49-F238E27FC236}">
-                <a16:creationId xmlns:a16="http://schemas.microsoft.com/office/drawing/2014/main" id="{DA0AF3B6-3151-9346-B00D-EBED7ED75F0D}"/>
-              </a:ext>
-            </a:extLst>
-          </p:cNvPr>
-          <p:cNvSpPr>
-            <a:spLocks noGrp="1"/>
-          </p:cNvSpPr>
-          <p:nvPr>
-            <p:ph type="pic" idx="1"/>
-          </p:nvPr>
-        </p:nvSpPr>
-        <p:spPr>
-          <a:xfrm>
-            <a:off x="5183188" y="987425"/>
-            <a:ext cx="6172200" cy="4873625"/>
-          </a:xfrm>
-        </p:spPr>
-        <p:txBody>
-          <a:bodyPr/>
-          <a:lstStyle>
-            <a:lvl1pPr marL="0" indent="0">
-              <a:buNone/>
-              <a:defRPr sz="3200"/>
-            </a:lvl1pPr>
-            <a:lvl2pPr marL="457200" indent="0">
-              <a:buNone/>
-              <a:defRPr sz="2800"/>
-            </a:lvl2pPr>
-            <a:lvl3pPr marL="914400" indent="0">
-              <a:buNone/>
-              <a:defRPr sz="2400"/>
-            </a:lvl3pPr>
-            <a:lvl4pPr marL="1371600" indent="0">
-              <a:buNone/>
-              <a:defRPr sz="2000"/>
-            </a:lvl4pPr>
-            <a:lvl5pPr marL="1828800" indent="0">
-              <a:buNone/>
-              <a:defRPr sz="2000"/>
-            </a:lvl5pPr>
-            <a:lvl6pPr marL="2286000" indent="0">
-              <a:buNone/>
-              <a:defRPr sz="2000"/>
-            </a:lvl6pPr>
-            <a:lvl7pPr marL="2743200" indent="0">
-              <a:buNone/>
-              <a:defRPr sz="2000"/>
-            </a:lvl7pPr>
-            <a:lvl8pPr marL="3200400" indent="0">
-              <a:buNone/>
-              <a:defRPr sz="2000"/>
-            </a:lvl8pPr>
-            <a:lvl9pPr marL="3657600" indent="0">
-              <a:buNone/>
-              <a:defRPr sz="2000"/>
-            </a:lvl9pPr>
-          </a:lstStyle>
-          <a:p>
-            <a:r>
-              <a:rPr lang="en-US"/>
-              <a:t>Click icon to add picture</a:t>
-            </a:r>
-          </a:p>
-        </p:txBody>
-      </p:sp>
-      <p:sp>
-        <p:nvSpPr>
-          <p:cNvPr id="4" name="Text Placeholder 3">
-            <a:extLst>
-              <a:ext uri="{FF2B5EF4-FFF2-40B4-BE49-F238E27FC236}">
-                <a16:creationId xmlns:a16="http://schemas.microsoft.com/office/drawing/2014/main" id="{CA5EF208-3C62-3840-A816-A69F27E0BF42}"/>
-              </a:ext>
-            </a:extLst>
-          </p:cNvPr>
-          <p:cNvSpPr>
-            <a:spLocks noGrp="1"/>
-          </p:cNvSpPr>
-          <p:nvPr>
-            <p:ph type="body" sz="half" idx="2"/>
-          </p:nvPr>
-        </p:nvSpPr>
-        <p:spPr>
-          <a:xfrm>
-            <a:off x="839788" y="2057400"/>
-            <a:ext cx="3932237" cy="3811588"/>
-          </a:xfrm>
-        </p:spPr>
-        <p:txBody>
-          <a:bodyPr/>
-          <a:lstStyle>
-            <a:lvl1pPr marL="0" indent="0">
-              <a:buNone/>
-              <a:defRPr sz="1600"/>
-            </a:lvl1pPr>
-            <a:lvl2pPr marL="457200" indent="0">
-              <a:buNone/>
-              <a:defRPr sz="1400"/>
-            </a:lvl2pPr>
-            <a:lvl3pPr marL="914400" indent="0">
-              <a:buNone/>
-              <a:defRPr sz="1200"/>
-            </a:lvl3pPr>
-            <a:lvl4pPr marL="1371600" indent="0">
-              <a:buNone/>
-              <a:defRPr sz="1000"/>
-            </a:lvl4pPr>
-            <a:lvl5pPr marL="1828800" indent="0">
-              <a:buNone/>
-              <a:defRPr sz="1000"/>
-            </a:lvl5pPr>
-            <a:lvl6pPr marL="2286000" indent="0">
-              <a:buNone/>
-              <a:defRPr sz="1000"/>
-            </a:lvl6pPr>
-            <a:lvl7pPr marL="2743200" indent="0">
-              <a:buNone/>
-              <a:defRPr sz="1000"/>
-            </a:lvl7pPr>
-            <a:lvl8pPr marL="3200400" indent="0">
-              <a:buNone/>
-              <a:defRPr sz="1000"/>
-            </a:lvl8pPr>
-            <a:lvl9pPr marL="3657600" indent="0">
-              <a:buNone/>
-              <a:defRPr sz="1000"/>
-            </a:lvl9pPr>
-          </a:lstStyle>
-          <a:p>
-            <a:pPr lvl="0"/>
-            <a:r>
-              <a:rPr lang="en-US"/>
-              <a:t>Click to edit Master text styles</a:t>
-            </a:r>
-          </a:p>
-        </p:txBody>
-      </p:sp>
-      <p:sp>
-        <p:nvSpPr>
-          <p:cNvPr id="6" name="Footer Placeholder 5">
-            <a:extLst>
-              <a:ext uri="{FF2B5EF4-FFF2-40B4-BE49-F238E27FC236}">
-                <a16:creationId xmlns:a16="http://schemas.microsoft.com/office/drawing/2014/main" id="{AB0C1DD0-6624-6048-953E-41055A0D34CB}"/>
-              </a:ext>
-            </a:extLst>
-          </p:cNvPr>
-          <p:cNvSpPr>
-            <a:spLocks noGrp="1"/>
-          </p:cNvSpPr>
-          <p:nvPr>
-            <p:ph type="ftr" sz="quarter" idx="11"/>
-          </p:nvPr>
-        </p:nvSpPr>
-        <p:spPr/>
-        <p:txBody>
-          <a:bodyPr/>
-          <a:lstStyle/>
-          <a:p>
-            <a:endParaRPr lang="en-US"/>
-          </a:p>
-        </p:txBody>
-      </p:sp>
-      <p:sp>
-        <p:nvSpPr>
-          <p:cNvPr id="7" name="Slide Number Placeholder 6">
-            <a:extLst>
-              <a:ext uri="{FF2B5EF4-FFF2-40B4-BE49-F238E27FC236}">
-                <a16:creationId xmlns:a16="http://schemas.microsoft.com/office/drawing/2014/main" id="{674C492C-9027-2B43-9637-56046A0631C2}"/>
-              </a:ext>
-            </a:extLst>
-          </p:cNvPr>
-          <p:cNvSpPr>
-            <a:spLocks noGrp="1"/>
-          </p:cNvSpPr>
-          <p:nvPr>
-            <p:ph type="sldNum" sz="quarter" idx="12"/>
-          </p:nvPr>
-        </p:nvSpPr>
-        <p:spPr>
-          <a:xfrm>
-            <a:off x="838200" y="6004323"/>
-            <a:ext cx="2676896" cy="365125"/>
-          </a:xfrm>
-        </p:spPr>
-        <p:txBody>
-          <a:bodyPr/>
-          <a:lstStyle/>
-          <a:p>
-            <a:fld id="{B4E9AFF7-6653-6A4D-A979-64D2F5BECA26}" type="slidenum">
-              <a:rPr lang="en-US" smtClean="0"/>
-              <a:t>‹#›</a:t>
-            </a:fld>
-            <a:endParaRPr lang="en-US"/>
-          </a:p>
-        </p:txBody>
-      </p:sp>
-    </p:spTree>
-    <p:extLst>
-      <p:ext uri="{BB962C8B-B14F-4D97-AF65-F5344CB8AC3E}">
-        <p14:creationId xmlns:p14="http://schemas.microsoft.com/office/powerpoint/2010/main" val="2128403082"/>
-      </p:ext>
-    </p:extLst>
-  </p:cSld>
-  <p:clrMapOvr>
-    <a:masterClrMapping/>
-  </p:clrMapOvr>
-</p:sldLayout>
-</file>
-
 <file path=ppt/slideMasters/slideMaster1.xml><?xml version="1.0" encoding="utf-8"?>
 <p:sldMaster xmlns:a="http://schemas.openxmlformats.org/drawingml/2006/main" xmlns:r="http://schemas.openxmlformats.org/officeDocument/2006/relationships" xmlns:p="http://schemas.openxmlformats.org/presentationml/2006/main">
   <p:cSld>
     <p:bg>
       <p:bgPr>
         <a:blipFill dpi="0" rotWithShape="1">
-          <a:blip r:embed="rId13">
+          <a:blip r:embed="rId8">
             <a:lum/>
           </a:blip>
           <a:srcRect/>
@@ -3433,15 +2190,10 @@
   <p:sldLayoutIdLst>
     <p:sldLayoutId id="2147483649" r:id="rId1"/>
     <p:sldLayoutId id="2147483650" r:id="rId2"/>
-    <p:sldLayoutId id="2147483651" r:id="rId3"/>
-    <p:sldLayoutId id="2147483652" r:id="rId4"/>
-    <p:sldLayoutId id="2147483653" r:id="rId5"/>
-    <p:sldLayoutId id="2147483654" r:id="rId6"/>
-    <p:sldLayoutId id="2147483655" r:id="rId7"/>
-    <p:sldLayoutId id="2147483656" r:id="rId8"/>
-    <p:sldLayoutId id="2147483657" r:id="rId9"/>
-    <p:sldLayoutId id="2147483658" r:id="rId10"/>
-    <p:sldLayoutId id="2147483659" r:id="rId11"/>
+    <p:sldLayoutId id="2147483652" r:id="rId3"/>
+    <p:sldLayoutId id="2147483654" r:id="rId4"/>
+    <p:sldLayoutId id="2147483658" r:id="rId5"/>
+    <p:sldLayoutId id="2147483659" r:id="rId6"/>
   </p:sldLayoutIdLst>
   <p:hf hdr="0" ftr="0" dt="0"/>
   <p:txStyles>

</xml_diff>

<commit_message>
updated spacing on final slide
</commit_message>
<xml_diff>
--- a/PowerPoint/ARTS-Lab_USC_slide_template.pptx
+++ b/PowerPoint/ARTS-Lab_USC_slide_template.pptx
@@ -227,7 +227,7 @@
           <a:p>
             <a:fld id="{7D038C9C-4B69-864E-9EEE-DFA43CC144D2}" type="datetimeFigureOut">
               <a:rPr lang="en-US" smtClean="0"/>
-              <a:t>11/13/2024</a:t>
+              <a:t>9/29/2025</a:t>
             </a:fld>
             <a:endParaRPr lang="en-US"/>
           </a:p>
@@ -404,7 +404,7 @@
           <a:p>
             <a:fld id="{41D9A61E-B1D6-C34D-A321-B3E90F6DE630}" type="datetimeFigureOut">
               <a:rPr lang="en-US" smtClean="0"/>
-              <a:t>11/13/2024</a:t>
+              <a:t>9/29/2025</a:t>
             </a:fld>
             <a:endParaRPr lang="en-US"/>
           </a:p>
@@ -3035,24 +3035,56 @@
           <a:bodyPr/>
           <a:lstStyle/>
           <a:p>
+            <a:pPr>
+              <a:lnSpc>
+                <a:spcPct val="100000"/>
+              </a:lnSpc>
+              <a:spcBef>
+                <a:spcPts val="0"/>
+              </a:spcBef>
+            </a:pPr>
             <a:r>
               <a:rPr lang="en-US" dirty="0"/>
               <a:t>Name:</a:t>
             </a:r>
           </a:p>
           <a:p>
+            <a:pPr>
+              <a:lnSpc>
+                <a:spcPct val="100000"/>
+              </a:lnSpc>
+              <a:spcBef>
+                <a:spcPts val="0"/>
+              </a:spcBef>
+            </a:pPr>
             <a:r>
               <a:rPr lang="en-US" dirty="0"/>
               <a:t>Title:</a:t>
             </a:r>
           </a:p>
           <a:p>
+            <a:pPr>
+              <a:lnSpc>
+                <a:spcPct val="100000"/>
+              </a:lnSpc>
+              <a:spcBef>
+                <a:spcPts val="0"/>
+              </a:spcBef>
+            </a:pPr>
             <a:r>
               <a:rPr lang="en-US" dirty="0"/>
               <a:t>Email:</a:t>
             </a:r>
           </a:p>
           <a:p>
+            <a:pPr>
+              <a:lnSpc>
+                <a:spcPct val="100000"/>
+              </a:lnSpc>
+              <a:spcBef>
+                <a:spcPts val="0"/>
+              </a:spcBef>
+            </a:pPr>
             <a:r>
               <a:rPr lang="en-US" dirty="0"/>
               <a:t>Lab GitHub: github.com/arts-laboratory</a:t>

</xml_diff>